<commit_message>
add new slides & files
</commit_message>
<xml_diff>
--- a/Разработка веб-сервисов.pptx
+++ b/Разработка веб-сервисов.pptx
@@ -5,10 +5,10 @@
     <p:sldMasterId id="2147483648" r:id="rId1"/>
   </p:sldMasterIdLst>
   <p:notesMasterIdLst>
-    <p:notesMasterId r:id="rId20"/>
+    <p:notesMasterId r:id="rId24"/>
   </p:notesMasterIdLst>
   <p:handoutMasterIdLst>
-    <p:handoutMasterId r:id="rId21"/>
+    <p:handoutMasterId r:id="rId25"/>
   </p:handoutMasterIdLst>
   <p:sldIdLst>
     <p:sldId id="256" r:id="rId2"/>
@@ -24,11 +24,15 @@
     <p:sldId id="426" r:id="rId12"/>
     <p:sldId id="427" r:id="rId13"/>
     <p:sldId id="412" r:id="rId14"/>
-    <p:sldId id="404" r:id="rId15"/>
-    <p:sldId id="406" r:id="rId16"/>
-    <p:sldId id="409" r:id="rId17"/>
-    <p:sldId id="377" r:id="rId18"/>
-    <p:sldId id="401" r:id="rId19"/>
+    <p:sldId id="429" r:id="rId15"/>
+    <p:sldId id="428" r:id="rId16"/>
+    <p:sldId id="430" r:id="rId17"/>
+    <p:sldId id="404" r:id="rId18"/>
+    <p:sldId id="406" r:id="rId19"/>
+    <p:sldId id="409" r:id="rId20"/>
+    <p:sldId id="401" r:id="rId21"/>
+    <p:sldId id="431" r:id="rId22"/>
+    <p:sldId id="377" r:id="rId23"/>
   </p:sldIdLst>
   <p:sldSz cx="9144000" cy="6858000" type="screen4x3"/>
   <p:notesSz cx="6797675" cy="9775825"/>
@@ -303,7 +307,7 @@
               <a:pPr>
                 <a:defRPr/>
               </a:pPr>
-              <a:t>06.07.2018</a:t>
+              <a:t>09.07.2018</a:t>
             </a:fld>
             <a:endParaRPr lang="ru-RU"/>
           </a:p>
@@ -502,7 +506,7 @@
               <a:pPr>
                 <a:defRPr/>
               </a:pPr>
-              <a:t>06.07.2018</a:t>
+              <a:t>09.07.2018</a:t>
             </a:fld>
             <a:endParaRPr lang="ru-RU"/>
           </a:p>
@@ -853,18 +857,6 @@
           <a:bodyPr/>
           <a:lstStyle/>
           <a:p>
-            <a:r>
-              <a:rPr lang="ru-RU" dirty="0" smtClean="0"/>
-              <a:t>Начнем</a:t>
-            </a:r>
-            <a:r>
-              <a:rPr lang="ru-RU" baseline="0" dirty="0" smtClean="0"/>
-              <a:t> издалека: с того, что такое Интернет и чем он отличается от </a:t>
-            </a:r>
-            <a:r>
-              <a:rPr lang="en-US" baseline="0" dirty="0" smtClean="0"/>
-              <a:t>WWW</a:t>
-            </a:r>
             <a:endParaRPr lang="ru-RU" dirty="0"/>
           </a:p>
         </p:txBody>
@@ -956,436 +948,40 @@
           <a:lstStyle/>
           <a:p>
             <a:r>
-              <a:rPr lang="ru-RU" sz="1200" b="0" i="0" kern="1200" dirty="0" smtClean="0">
-                <a:solidFill>
-                  <a:schemeClr val="tx1"/>
-                </a:solidFill>
-                <a:effectLst/>
-                <a:latin typeface="+mn-lt"/>
-                <a:ea typeface="+mn-ea"/>
-                <a:cs typeface="+mn-cs"/>
-              </a:rPr>
-              <a:t>Это формат который пришел из языка </a:t>
-            </a:r>
-            <a:r>
-              <a:rPr lang="en-US" sz="1200" b="0" i="0" kern="1200" dirty="0" smtClean="0">
-                <a:solidFill>
-                  <a:schemeClr val="tx1"/>
-                </a:solidFill>
-                <a:effectLst/>
-                <a:latin typeface="+mn-lt"/>
-                <a:ea typeface="+mn-ea"/>
-                <a:cs typeface="+mn-cs"/>
-              </a:rPr>
-              <a:t>JavaScript</a:t>
-            </a:r>
-          </a:p>
-          <a:p>
-            <a:r>
-              <a:rPr lang="ru-RU" sz="1200" b="0" i="0" kern="1200" dirty="0" smtClean="0">
-                <a:solidFill>
-                  <a:schemeClr val="tx1"/>
-                </a:solidFill>
-                <a:effectLst/>
-                <a:latin typeface="+mn-lt"/>
-                <a:ea typeface="+mn-ea"/>
-                <a:cs typeface="+mn-cs"/>
-              </a:rPr>
-              <a:t>Похож на словарь </a:t>
-            </a:r>
-            <a:r>
-              <a:rPr lang="en-US" sz="1200" b="0" i="0" kern="1200" dirty="0" smtClean="0">
-                <a:solidFill>
-                  <a:schemeClr val="tx1"/>
-                </a:solidFill>
-                <a:effectLst/>
-                <a:latin typeface="+mn-lt"/>
-                <a:ea typeface="+mn-ea"/>
-                <a:cs typeface="+mn-cs"/>
-              </a:rPr>
-              <a:t>Python.</a:t>
-            </a:r>
-            <a:endParaRPr lang="ru-RU" sz="1200" b="0" i="0" kern="1200" dirty="0" smtClean="0">
-              <a:solidFill>
-                <a:schemeClr val="tx1"/>
-              </a:solidFill>
-              <a:effectLst/>
-              <a:latin typeface="+mn-lt"/>
-              <a:ea typeface="+mn-ea"/>
-              <a:cs typeface="+mn-cs"/>
-            </a:endParaRPr>
-          </a:p>
-          <a:p>
-            <a:r>
-              <a:rPr lang="ru-RU" sz="1200" b="0" i="0" kern="1200" dirty="0" smtClean="0">
-                <a:solidFill>
-                  <a:schemeClr val="tx1"/>
-                </a:solidFill>
-                <a:effectLst/>
-                <a:latin typeface="+mn-lt"/>
-                <a:ea typeface="+mn-ea"/>
-                <a:cs typeface="+mn-cs"/>
-              </a:rPr>
-              <a:t>JSON-текст представляет собой (в закодированном виде):</a:t>
-            </a:r>
-          </a:p>
-          <a:p>
-            <a:r>
-              <a:rPr lang="ru-RU" sz="1200" b="0" i="0" kern="1200" dirty="0" smtClean="0">
-                <a:solidFill>
-                  <a:schemeClr val="tx1"/>
-                </a:solidFill>
-                <a:effectLst/>
-                <a:latin typeface="+mn-lt"/>
-                <a:ea typeface="+mn-ea"/>
-                <a:cs typeface="+mn-cs"/>
-              </a:rPr>
-              <a:t>Набор пар </a:t>
-            </a:r>
-            <a:r>
-              <a:rPr lang="ru-RU" sz="1200" b="0" i="1" kern="1200" dirty="0" smtClean="0">
-                <a:solidFill>
-                  <a:schemeClr val="tx1"/>
-                </a:solidFill>
-                <a:effectLst/>
-                <a:latin typeface="+mn-lt"/>
-                <a:ea typeface="+mn-ea"/>
-                <a:cs typeface="+mn-cs"/>
-              </a:rPr>
-              <a:t>ключ: значение</a:t>
-            </a:r>
-            <a:r>
-              <a:rPr lang="ru-RU" sz="1200" b="0" i="0" kern="1200" dirty="0" smtClean="0">
-                <a:solidFill>
-                  <a:schemeClr val="tx1"/>
-                </a:solidFill>
-                <a:effectLst/>
-                <a:latin typeface="+mn-lt"/>
-                <a:ea typeface="+mn-ea"/>
-                <a:cs typeface="+mn-cs"/>
-              </a:rPr>
-              <a:t>.</a:t>
-            </a:r>
-          </a:p>
-          <a:p>
-            <a:pPr marL="0" marR="0" lvl="0" indent="0" algn="l" defTabSz="914400" rtl="0" eaLnBrk="1" fontAlgn="base" latinLnBrk="0" hangingPunct="1">
-              <a:lnSpc>
-                <a:spcPct val="100000"/>
-              </a:lnSpc>
-              <a:spcBef>
-                <a:spcPct val="30000"/>
-              </a:spcBef>
-              <a:spcAft>
-                <a:spcPct val="0"/>
-              </a:spcAft>
-              <a:buClrTx/>
-              <a:buSzTx/>
+              <a:rPr lang="ru-RU" dirty="0" smtClean="0"/>
+              <a:t>Зачем нужен</a:t>
+            </a:r>
+            <a:r>
+              <a:rPr lang="ru-RU" baseline="0" dirty="0" smtClean="0"/>
+              <a:t> </a:t>
+            </a:r>
+            <a:r>
+              <a:rPr lang="en-US" baseline="0" dirty="0" smtClean="0"/>
+              <a:t>HEAD</a:t>
+            </a:r>
+            <a:r>
+              <a:rPr lang="ru-RU" baseline="0" dirty="0" smtClean="0"/>
+              <a:t> запрос?</a:t>
+            </a:r>
+          </a:p>
+          <a:p>
+            <a:pPr marL="171450" indent="-171450">
               <a:buFontTx/>
-              <a:buNone/>
-              <a:tabLst/>
-              <a:defRPr/>
+              <a:buChar char="-"/>
             </a:pPr>
             <a:r>
-              <a:rPr lang="ru-RU" sz="1200" b="0" i="0" kern="1200" dirty="0" smtClean="0">
-                <a:solidFill>
-                  <a:schemeClr val="tx1"/>
-                </a:solidFill>
-                <a:effectLst/>
-                <a:latin typeface="+mn-lt"/>
-                <a:ea typeface="+mn-ea"/>
-                <a:cs typeface="+mn-cs"/>
-              </a:rPr>
-              <a:t>Тело </a:t>
-            </a:r>
-            <a:r>
-              <a:rPr lang="en-US" sz="1200" b="0" i="0" kern="1200" dirty="0" smtClean="0">
-                <a:solidFill>
-                  <a:schemeClr val="tx1"/>
-                </a:solidFill>
-                <a:effectLst/>
-                <a:latin typeface="+mn-lt"/>
-                <a:ea typeface="+mn-ea"/>
-                <a:cs typeface="+mn-cs"/>
-              </a:rPr>
-              <a:t>JSON </a:t>
-            </a:r>
-            <a:r>
-              <a:rPr lang="ru-RU" sz="1200" b="0" i="0" kern="1200" dirty="0" smtClean="0">
-                <a:solidFill>
-                  <a:schemeClr val="tx1"/>
-                </a:solidFill>
-                <a:effectLst/>
-                <a:latin typeface="+mn-lt"/>
-                <a:ea typeface="+mn-ea"/>
-                <a:cs typeface="+mn-cs"/>
-              </a:rPr>
-              <a:t>заключено в фигурные скобки. Слева от двоеточия</a:t>
-            </a:r>
-            <a:r>
-              <a:rPr lang="ru-RU" sz="1200" b="0" i="0" kern="1200" baseline="0" dirty="0" smtClean="0">
-                <a:solidFill>
-                  <a:schemeClr val="tx1"/>
-                </a:solidFill>
-                <a:effectLst/>
-                <a:latin typeface="+mn-lt"/>
-                <a:ea typeface="+mn-ea"/>
-                <a:cs typeface="+mn-cs"/>
-              </a:rPr>
-              <a:t> – ключ, справа – значение. Например для первого </a:t>
-            </a:r>
-            <a:r>
-              <a:rPr lang="en-US" sz="1200" b="0" i="0" kern="1200" baseline="0" dirty="0" smtClean="0">
-                <a:solidFill>
-                  <a:schemeClr val="tx1"/>
-                </a:solidFill>
-                <a:effectLst/>
-                <a:latin typeface="+mn-lt"/>
-                <a:ea typeface="+mn-ea"/>
-                <a:cs typeface="+mn-cs"/>
-              </a:rPr>
-              <a:t>JSONA</a:t>
-            </a:r>
-            <a:r>
-              <a:rPr lang="ru-RU" sz="1200" b="0" i="0" kern="1200" baseline="0" dirty="0" smtClean="0">
-                <a:solidFill>
-                  <a:schemeClr val="tx1"/>
-                </a:solidFill>
-                <a:effectLst/>
-                <a:latin typeface="+mn-lt"/>
-                <a:ea typeface="+mn-ea"/>
-                <a:cs typeface="+mn-cs"/>
-              </a:rPr>
-              <a:t> и т.д.</a:t>
-            </a:r>
-            <a:endParaRPr lang="ru-RU" sz="1200" b="0" i="0" kern="1200" dirty="0" smtClean="0">
-              <a:solidFill>
-                <a:schemeClr val="tx1"/>
-              </a:solidFill>
-              <a:effectLst/>
-              <a:latin typeface="+mn-lt"/>
-              <a:ea typeface="+mn-ea"/>
-              <a:cs typeface="+mn-cs"/>
-            </a:endParaRPr>
-          </a:p>
-          <a:p>
-            <a:endParaRPr lang="en-US" sz="1200" b="0" i="0" kern="1200" dirty="0" smtClean="0">
-              <a:solidFill>
-                <a:schemeClr val="tx1"/>
-              </a:solidFill>
-              <a:effectLst/>
-              <a:latin typeface="+mn-lt"/>
-              <a:ea typeface="+mn-ea"/>
-              <a:cs typeface="+mn-cs"/>
-            </a:endParaRPr>
-          </a:p>
-          <a:p>
-            <a:r>
-              <a:rPr lang="ru-RU" sz="1200" b="0" i="0" kern="1200" dirty="0" smtClean="0">
-                <a:solidFill>
-                  <a:schemeClr val="tx1"/>
-                </a:solidFill>
-                <a:effectLst/>
-                <a:latin typeface="+mn-lt"/>
-                <a:ea typeface="+mn-ea"/>
-                <a:cs typeface="+mn-cs"/>
-              </a:rPr>
-              <a:t>Ключом может быть только строка</a:t>
-            </a:r>
-            <a:r>
-              <a:rPr lang="en-US" sz="1200" b="0" i="0" kern="1200" dirty="0" smtClean="0">
-                <a:solidFill>
-                  <a:schemeClr val="tx1"/>
-                </a:solidFill>
-                <a:effectLst/>
-                <a:latin typeface="+mn-lt"/>
-                <a:ea typeface="+mn-ea"/>
-                <a:cs typeface="+mn-cs"/>
-              </a:rPr>
-              <a:t>.</a:t>
-            </a:r>
-            <a:endParaRPr lang="ru-RU" sz="1200" b="0" i="0" kern="1200" dirty="0" smtClean="0">
-              <a:solidFill>
-                <a:schemeClr val="tx1"/>
-              </a:solidFill>
-              <a:effectLst/>
-              <a:latin typeface="+mn-lt"/>
-              <a:ea typeface="+mn-ea"/>
-              <a:cs typeface="+mn-cs"/>
-            </a:endParaRPr>
-          </a:p>
-          <a:p>
-            <a:r>
-              <a:rPr lang="ru-RU" sz="1200" b="0" i="0" kern="1200" dirty="0" smtClean="0">
-                <a:solidFill>
-                  <a:schemeClr val="tx1"/>
-                </a:solidFill>
-                <a:effectLst/>
-                <a:latin typeface="+mn-lt"/>
-                <a:ea typeface="+mn-ea"/>
-                <a:cs typeface="+mn-cs"/>
-              </a:rPr>
-              <a:t>В качестве значений в JSON могут быть использованы:</a:t>
-            </a:r>
-            <a:endParaRPr lang="en-US" sz="1200" b="0" i="0" kern="1200" dirty="0" smtClean="0">
-              <a:solidFill>
-                <a:schemeClr val="tx1"/>
-              </a:solidFill>
-              <a:effectLst/>
-              <a:latin typeface="+mn-lt"/>
-              <a:ea typeface="+mn-ea"/>
-              <a:cs typeface="+mn-cs"/>
-            </a:endParaRPr>
-          </a:p>
-          <a:p>
-            <a:r>
-              <a:rPr lang="ru-RU" sz="1200" b="1" i="0" kern="1200" dirty="0" smtClean="0">
-                <a:solidFill>
-                  <a:schemeClr val="tx1"/>
-                </a:solidFill>
-                <a:effectLst/>
-                <a:latin typeface="+mn-lt"/>
-                <a:ea typeface="+mn-ea"/>
-                <a:cs typeface="+mn-cs"/>
-              </a:rPr>
-              <a:t>Число</a:t>
-            </a:r>
-            <a:endParaRPr lang="en-US" sz="1200" b="1" i="0" kern="1200" dirty="0" smtClean="0">
-              <a:solidFill>
-                <a:schemeClr val="tx1"/>
-              </a:solidFill>
-              <a:effectLst/>
-              <a:latin typeface="+mn-lt"/>
-              <a:ea typeface="+mn-ea"/>
-              <a:cs typeface="+mn-cs"/>
-            </a:endParaRPr>
-          </a:p>
-          <a:p>
-            <a:r>
-              <a:rPr lang="ru-RU" sz="1200" b="1" i="0" kern="1200" dirty="0" smtClean="0">
-                <a:solidFill>
-                  <a:schemeClr val="tx1"/>
-                </a:solidFill>
-                <a:effectLst/>
-                <a:latin typeface="+mn-lt"/>
-                <a:ea typeface="+mn-ea"/>
-                <a:cs typeface="+mn-cs"/>
-              </a:rPr>
-              <a:t>Строка</a:t>
-            </a:r>
-            <a:endParaRPr lang="en-US" sz="1200" b="1" i="0" kern="1200" dirty="0" smtClean="0">
-              <a:solidFill>
-                <a:schemeClr val="tx1"/>
-              </a:solidFill>
-              <a:effectLst/>
-              <a:latin typeface="+mn-lt"/>
-              <a:ea typeface="+mn-ea"/>
-              <a:cs typeface="+mn-cs"/>
-            </a:endParaRPr>
-          </a:p>
-          <a:p>
-            <a:r>
-              <a:rPr lang="en-US" sz="1200" b="0" i="1" kern="1200" dirty="0" smtClean="0">
-                <a:solidFill>
-                  <a:schemeClr val="tx1"/>
-                </a:solidFill>
-                <a:effectLst/>
-                <a:latin typeface="+mn-lt"/>
-                <a:ea typeface="+mn-ea"/>
-                <a:cs typeface="+mn-cs"/>
-              </a:rPr>
-              <a:t>TRUE, FALSE</a:t>
-            </a:r>
-            <a:endParaRPr lang="en-US" sz="1200" b="0" i="0" kern="1200" dirty="0" smtClean="0">
-              <a:solidFill>
-                <a:schemeClr val="tx1"/>
-              </a:solidFill>
-              <a:effectLst/>
-              <a:latin typeface="+mn-lt"/>
-              <a:ea typeface="+mn-ea"/>
-              <a:cs typeface="+mn-cs"/>
-            </a:endParaRPr>
-          </a:p>
-          <a:p>
-            <a:r>
-              <a:rPr lang="ru-RU" sz="1200" b="1" i="0" kern="1200" dirty="0" smtClean="0">
-                <a:solidFill>
-                  <a:schemeClr val="tx1"/>
-                </a:solidFill>
-                <a:effectLst/>
-                <a:latin typeface="+mn-lt"/>
-                <a:ea typeface="+mn-ea"/>
-                <a:cs typeface="+mn-cs"/>
-              </a:rPr>
-              <a:t>Массив</a:t>
-            </a:r>
-            <a:endParaRPr lang="en-US" sz="1200" b="1" i="0" kern="1200" dirty="0" smtClean="0">
-              <a:solidFill>
-                <a:schemeClr val="tx1"/>
-              </a:solidFill>
-              <a:effectLst/>
-              <a:latin typeface="+mn-lt"/>
-              <a:ea typeface="+mn-ea"/>
-              <a:cs typeface="+mn-cs"/>
-            </a:endParaRPr>
-          </a:p>
-          <a:p>
-            <a:r>
-              <a:rPr lang="en-US" sz="1200" b="1" i="0" kern="1200" dirty="0" smtClean="0">
-                <a:solidFill>
-                  <a:schemeClr val="tx1"/>
-                </a:solidFill>
-                <a:effectLst/>
-                <a:latin typeface="+mn-lt"/>
-                <a:ea typeface="+mn-ea"/>
-                <a:cs typeface="+mn-cs"/>
-              </a:rPr>
-              <a:t>JSON</a:t>
-            </a:r>
-            <a:endParaRPr lang="ru-RU" sz="1200" b="1" i="0" kern="1200" dirty="0" smtClean="0">
-              <a:solidFill>
-                <a:schemeClr val="tx1"/>
-              </a:solidFill>
-              <a:effectLst/>
-              <a:latin typeface="+mn-lt"/>
-              <a:ea typeface="+mn-ea"/>
-              <a:cs typeface="+mn-cs"/>
-            </a:endParaRPr>
-          </a:p>
-          <a:p>
-            <a:endParaRPr lang="ru-RU" sz="1200" b="0" i="0" kern="1200" dirty="0" smtClean="0">
-              <a:solidFill>
-                <a:schemeClr val="tx1"/>
-              </a:solidFill>
-              <a:effectLst/>
-              <a:latin typeface="+mn-lt"/>
-              <a:ea typeface="+mn-ea"/>
-              <a:cs typeface="+mn-cs"/>
-            </a:endParaRPr>
-          </a:p>
-          <a:p>
-            <a:r>
-              <a:rPr lang="en-US" sz="1200" b="0" i="0" kern="1200" dirty="0" smtClean="0">
-                <a:solidFill>
-                  <a:schemeClr val="tx1"/>
-                </a:solidFill>
-                <a:effectLst/>
-                <a:latin typeface="+mn-lt"/>
-                <a:ea typeface="+mn-ea"/>
-                <a:cs typeface="+mn-cs"/>
-              </a:rPr>
-              <a:t>JSON</a:t>
-            </a:r>
-            <a:r>
-              <a:rPr lang="ru-RU" sz="1200" b="0" i="0" kern="1200" baseline="0" dirty="0" smtClean="0">
-                <a:solidFill>
-                  <a:schemeClr val="tx1"/>
-                </a:solidFill>
-                <a:effectLst/>
-                <a:latin typeface="+mn-lt"/>
-                <a:ea typeface="+mn-ea"/>
-                <a:cs typeface="+mn-cs"/>
-              </a:rPr>
-              <a:t> мы будем использовать в наших веб приложениях, поэтому пару задачек на эту тему</a:t>
+              <a:rPr lang="ru-RU" baseline="0" dirty="0" smtClean="0"/>
+              <a:t>Проверяет наличие документа</a:t>
+            </a:r>
+          </a:p>
+          <a:p>
+            <a:pPr marL="171450" indent="-171450">
+              <a:buFontTx/>
+              <a:buChar char="-"/>
+            </a:pPr>
+            <a:r>
+              <a:rPr lang="ru-RU" baseline="0" dirty="0" smtClean="0"/>
+              <a:t>Экономит трафик: можно пользоваться старой версией документа из кэша, и проверять только свежесть документа</a:t>
             </a:r>
             <a:endParaRPr lang="ru-RU" dirty="0"/>
           </a:p>
@@ -1414,7 +1010,7 @@
               <a:pPr>
                 <a:defRPr/>
               </a:pPr>
-              <a:t>14</a:t>
+              <a:t>15</a:t>
             </a:fld>
             <a:endParaRPr lang="ru-RU"/>
           </a:p>
@@ -1423,7 +1019,7 @@
     </p:spTree>
     <p:extLst>
       <p:ext uri="{BB962C8B-B14F-4D97-AF65-F5344CB8AC3E}">
-        <p14:creationId xmlns:p14="http://schemas.microsoft.com/office/powerpoint/2010/main" val="813356846"/>
+        <p14:creationId xmlns:p14="http://schemas.microsoft.com/office/powerpoint/2010/main" val="1247693671"/>
       </p:ext>
     </p:extLst>
   </p:cSld>
@@ -1477,14 +1073,6 @@
           <a:bodyPr/>
           <a:lstStyle/>
           <a:p>
-            <a:r>
-              <a:rPr lang="ru-RU" dirty="0" smtClean="0"/>
-              <a:t>Сохранять их где-то,</a:t>
-            </a:r>
-            <a:r>
-              <a:rPr lang="ru-RU" baseline="0" dirty="0" smtClean="0"/>
-              <a:t> они потом нужны будут</a:t>
-            </a:r>
             <a:endParaRPr lang="ru-RU" dirty="0"/>
           </a:p>
         </p:txBody>
@@ -1512,7 +1100,7 @@
               <a:pPr>
                 <a:defRPr/>
               </a:pPr>
-              <a:t>15</a:t>
+              <a:t>16</a:t>
             </a:fld>
             <a:endParaRPr lang="ru-RU"/>
           </a:p>
@@ -1521,7 +1109,7 @@
     </p:spTree>
     <p:extLst>
       <p:ext uri="{BB962C8B-B14F-4D97-AF65-F5344CB8AC3E}">
-        <p14:creationId xmlns:p14="http://schemas.microsoft.com/office/powerpoint/2010/main" val="2743639933"/>
+        <p14:creationId xmlns:p14="http://schemas.microsoft.com/office/powerpoint/2010/main" val="3421346147"/>
       </p:ext>
     </p:extLst>
   </p:cSld>
@@ -1576,16 +1164,436 @@
           <a:lstStyle/>
           <a:p>
             <a:r>
-              <a:rPr lang="ru-RU" dirty="0" smtClean="0"/>
-              <a:t>По 1.</a:t>
-            </a:r>
-            <a:r>
-              <a:rPr lang="ru-RU" baseline="0" dirty="0" smtClean="0"/>
-              <a:t> Например, ключи: товар, количество, цена, артикул и </a:t>
-            </a:r>
-            <a:r>
-              <a:rPr lang="ru-RU" baseline="0" dirty="0" err="1" smtClean="0"/>
-              <a:t>тэдэ</a:t>
+              <a:rPr lang="ru-RU" sz="1200" b="0" i="0" kern="1200" dirty="0" smtClean="0">
+                <a:solidFill>
+                  <a:schemeClr val="tx1"/>
+                </a:solidFill>
+                <a:effectLst/>
+                <a:latin typeface="+mn-lt"/>
+                <a:ea typeface="+mn-ea"/>
+                <a:cs typeface="+mn-cs"/>
+              </a:rPr>
+              <a:t>Это формат который пришел из языка </a:t>
+            </a:r>
+            <a:r>
+              <a:rPr lang="en-US" sz="1200" b="0" i="0" kern="1200" dirty="0" smtClean="0">
+                <a:solidFill>
+                  <a:schemeClr val="tx1"/>
+                </a:solidFill>
+                <a:effectLst/>
+                <a:latin typeface="+mn-lt"/>
+                <a:ea typeface="+mn-ea"/>
+                <a:cs typeface="+mn-cs"/>
+              </a:rPr>
+              <a:t>JavaScript</a:t>
+            </a:r>
+          </a:p>
+          <a:p>
+            <a:r>
+              <a:rPr lang="ru-RU" sz="1200" b="0" i="0" kern="1200" dirty="0" smtClean="0">
+                <a:solidFill>
+                  <a:schemeClr val="tx1"/>
+                </a:solidFill>
+                <a:effectLst/>
+                <a:latin typeface="+mn-lt"/>
+                <a:ea typeface="+mn-ea"/>
+                <a:cs typeface="+mn-cs"/>
+              </a:rPr>
+              <a:t>Похож на словарь </a:t>
+            </a:r>
+            <a:r>
+              <a:rPr lang="en-US" sz="1200" b="0" i="0" kern="1200" dirty="0" smtClean="0">
+                <a:solidFill>
+                  <a:schemeClr val="tx1"/>
+                </a:solidFill>
+                <a:effectLst/>
+                <a:latin typeface="+mn-lt"/>
+                <a:ea typeface="+mn-ea"/>
+                <a:cs typeface="+mn-cs"/>
+              </a:rPr>
+              <a:t>Python.</a:t>
+            </a:r>
+            <a:endParaRPr lang="ru-RU" sz="1200" b="0" i="0" kern="1200" dirty="0" smtClean="0">
+              <a:solidFill>
+                <a:schemeClr val="tx1"/>
+              </a:solidFill>
+              <a:effectLst/>
+              <a:latin typeface="+mn-lt"/>
+              <a:ea typeface="+mn-ea"/>
+              <a:cs typeface="+mn-cs"/>
+            </a:endParaRPr>
+          </a:p>
+          <a:p>
+            <a:r>
+              <a:rPr lang="ru-RU" sz="1200" b="0" i="0" kern="1200" dirty="0" smtClean="0">
+                <a:solidFill>
+                  <a:schemeClr val="tx1"/>
+                </a:solidFill>
+                <a:effectLst/>
+                <a:latin typeface="+mn-lt"/>
+                <a:ea typeface="+mn-ea"/>
+                <a:cs typeface="+mn-cs"/>
+              </a:rPr>
+              <a:t>JSON-текст представляет собой (в закодированном виде):</a:t>
+            </a:r>
+          </a:p>
+          <a:p>
+            <a:r>
+              <a:rPr lang="ru-RU" sz="1200" b="0" i="0" kern="1200" dirty="0" smtClean="0">
+                <a:solidFill>
+                  <a:schemeClr val="tx1"/>
+                </a:solidFill>
+                <a:effectLst/>
+                <a:latin typeface="+mn-lt"/>
+                <a:ea typeface="+mn-ea"/>
+                <a:cs typeface="+mn-cs"/>
+              </a:rPr>
+              <a:t>Набор пар </a:t>
+            </a:r>
+            <a:r>
+              <a:rPr lang="ru-RU" sz="1200" b="0" i="1" kern="1200" dirty="0" smtClean="0">
+                <a:solidFill>
+                  <a:schemeClr val="tx1"/>
+                </a:solidFill>
+                <a:effectLst/>
+                <a:latin typeface="+mn-lt"/>
+                <a:ea typeface="+mn-ea"/>
+                <a:cs typeface="+mn-cs"/>
+              </a:rPr>
+              <a:t>ключ: значение</a:t>
+            </a:r>
+            <a:r>
+              <a:rPr lang="ru-RU" sz="1200" b="0" i="0" kern="1200" dirty="0" smtClean="0">
+                <a:solidFill>
+                  <a:schemeClr val="tx1"/>
+                </a:solidFill>
+                <a:effectLst/>
+                <a:latin typeface="+mn-lt"/>
+                <a:ea typeface="+mn-ea"/>
+                <a:cs typeface="+mn-cs"/>
+              </a:rPr>
+              <a:t>.</a:t>
+            </a:r>
+          </a:p>
+          <a:p>
+            <a:pPr marL="0" marR="0" lvl="0" indent="0" algn="l" defTabSz="914400" rtl="0" eaLnBrk="1" fontAlgn="base" latinLnBrk="0" hangingPunct="1">
+              <a:lnSpc>
+                <a:spcPct val="100000"/>
+              </a:lnSpc>
+              <a:spcBef>
+                <a:spcPct val="30000"/>
+              </a:spcBef>
+              <a:spcAft>
+                <a:spcPct val="0"/>
+              </a:spcAft>
+              <a:buClrTx/>
+              <a:buSzTx/>
+              <a:buFontTx/>
+              <a:buNone/>
+              <a:tabLst/>
+              <a:defRPr/>
+            </a:pPr>
+            <a:r>
+              <a:rPr lang="ru-RU" sz="1200" b="0" i="0" kern="1200" dirty="0" smtClean="0">
+                <a:solidFill>
+                  <a:schemeClr val="tx1"/>
+                </a:solidFill>
+                <a:effectLst/>
+                <a:latin typeface="+mn-lt"/>
+                <a:ea typeface="+mn-ea"/>
+                <a:cs typeface="+mn-cs"/>
+              </a:rPr>
+              <a:t>Тело </a:t>
+            </a:r>
+            <a:r>
+              <a:rPr lang="en-US" sz="1200" b="0" i="0" kern="1200" dirty="0" smtClean="0">
+                <a:solidFill>
+                  <a:schemeClr val="tx1"/>
+                </a:solidFill>
+                <a:effectLst/>
+                <a:latin typeface="+mn-lt"/>
+                <a:ea typeface="+mn-ea"/>
+                <a:cs typeface="+mn-cs"/>
+              </a:rPr>
+              <a:t>JSON </a:t>
+            </a:r>
+            <a:r>
+              <a:rPr lang="ru-RU" sz="1200" b="0" i="0" kern="1200" dirty="0" smtClean="0">
+                <a:solidFill>
+                  <a:schemeClr val="tx1"/>
+                </a:solidFill>
+                <a:effectLst/>
+                <a:latin typeface="+mn-lt"/>
+                <a:ea typeface="+mn-ea"/>
+                <a:cs typeface="+mn-cs"/>
+              </a:rPr>
+              <a:t>заключено в фигурные скобки. Слева от двоеточия</a:t>
+            </a:r>
+            <a:r>
+              <a:rPr lang="ru-RU" sz="1200" b="0" i="0" kern="1200" baseline="0" dirty="0" smtClean="0">
+                <a:solidFill>
+                  <a:schemeClr val="tx1"/>
+                </a:solidFill>
+                <a:effectLst/>
+                <a:latin typeface="+mn-lt"/>
+                <a:ea typeface="+mn-ea"/>
+                <a:cs typeface="+mn-cs"/>
+              </a:rPr>
+              <a:t> – ключ, справа – значение. Например для первого </a:t>
+            </a:r>
+            <a:r>
+              <a:rPr lang="en-US" sz="1200" b="0" i="0" kern="1200" baseline="0" dirty="0" smtClean="0">
+                <a:solidFill>
+                  <a:schemeClr val="tx1"/>
+                </a:solidFill>
+                <a:effectLst/>
+                <a:latin typeface="+mn-lt"/>
+                <a:ea typeface="+mn-ea"/>
+                <a:cs typeface="+mn-cs"/>
+              </a:rPr>
+              <a:t>JSONA</a:t>
+            </a:r>
+            <a:r>
+              <a:rPr lang="ru-RU" sz="1200" b="0" i="0" kern="1200" baseline="0" dirty="0" smtClean="0">
+                <a:solidFill>
+                  <a:schemeClr val="tx1"/>
+                </a:solidFill>
+                <a:effectLst/>
+                <a:latin typeface="+mn-lt"/>
+                <a:ea typeface="+mn-ea"/>
+                <a:cs typeface="+mn-cs"/>
+              </a:rPr>
+              <a:t> и т.д.</a:t>
+            </a:r>
+            <a:endParaRPr lang="ru-RU" sz="1200" b="0" i="0" kern="1200" dirty="0" smtClean="0">
+              <a:solidFill>
+                <a:schemeClr val="tx1"/>
+              </a:solidFill>
+              <a:effectLst/>
+              <a:latin typeface="+mn-lt"/>
+              <a:ea typeface="+mn-ea"/>
+              <a:cs typeface="+mn-cs"/>
+            </a:endParaRPr>
+          </a:p>
+          <a:p>
+            <a:endParaRPr lang="en-US" sz="1200" b="0" i="0" kern="1200" dirty="0" smtClean="0">
+              <a:solidFill>
+                <a:schemeClr val="tx1"/>
+              </a:solidFill>
+              <a:effectLst/>
+              <a:latin typeface="+mn-lt"/>
+              <a:ea typeface="+mn-ea"/>
+              <a:cs typeface="+mn-cs"/>
+            </a:endParaRPr>
+          </a:p>
+          <a:p>
+            <a:r>
+              <a:rPr lang="ru-RU" sz="1200" b="0" i="0" kern="1200" dirty="0" smtClean="0">
+                <a:solidFill>
+                  <a:schemeClr val="tx1"/>
+                </a:solidFill>
+                <a:effectLst/>
+                <a:latin typeface="+mn-lt"/>
+                <a:ea typeface="+mn-ea"/>
+                <a:cs typeface="+mn-cs"/>
+              </a:rPr>
+              <a:t>Ключом может быть только строка</a:t>
+            </a:r>
+            <a:r>
+              <a:rPr lang="en-US" sz="1200" b="0" i="0" kern="1200" dirty="0" smtClean="0">
+                <a:solidFill>
+                  <a:schemeClr val="tx1"/>
+                </a:solidFill>
+                <a:effectLst/>
+                <a:latin typeface="+mn-lt"/>
+                <a:ea typeface="+mn-ea"/>
+                <a:cs typeface="+mn-cs"/>
+              </a:rPr>
+              <a:t>.</a:t>
+            </a:r>
+            <a:endParaRPr lang="ru-RU" sz="1200" b="0" i="0" kern="1200" dirty="0" smtClean="0">
+              <a:solidFill>
+                <a:schemeClr val="tx1"/>
+              </a:solidFill>
+              <a:effectLst/>
+              <a:latin typeface="+mn-lt"/>
+              <a:ea typeface="+mn-ea"/>
+              <a:cs typeface="+mn-cs"/>
+            </a:endParaRPr>
+          </a:p>
+          <a:p>
+            <a:r>
+              <a:rPr lang="ru-RU" sz="1200" b="0" i="0" kern="1200" dirty="0" smtClean="0">
+                <a:solidFill>
+                  <a:schemeClr val="tx1"/>
+                </a:solidFill>
+                <a:effectLst/>
+                <a:latin typeface="+mn-lt"/>
+                <a:ea typeface="+mn-ea"/>
+                <a:cs typeface="+mn-cs"/>
+              </a:rPr>
+              <a:t>В качестве значений в JSON могут быть использованы:</a:t>
+            </a:r>
+            <a:endParaRPr lang="en-US" sz="1200" b="0" i="0" kern="1200" dirty="0" smtClean="0">
+              <a:solidFill>
+                <a:schemeClr val="tx1"/>
+              </a:solidFill>
+              <a:effectLst/>
+              <a:latin typeface="+mn-lt"/>
+              <a:ea typeface="+mn-ea"/>
+              <a:cs typeface="+mn-cs"/>
+            </a:endParaRPr>
+          </a:p>
+          <a:p>
+            <a:r>
+              <a:rPr lang="ru-RU" sz="1200" b="1" i="0" kern="1200" dirty="0" smtClean="0">
+                <a:solidFill>
+                  <a:schemeClr val="tx1"/>
+                </a:solidFill>
+                <a:effectLst/>
+                <a:latin typeface="+mn-lt"/>
+                <a:ea typeface="+mn-ea"/>
+                <a:cs typeface="+mn-cs"/>
+              </a:rPr>
+              <a:t>Число</a:t>
+            </a:r>
+            <a:endParaRPr lang="en-US" sz="1200" b="1" i="0" kern="1200" dirty="0" smtClean="0">
+              <a:solidFill>
+                <a:schemeClr val="tx1"/>
+              </a:solidFill>
+              <a:effectLst/>
+              <a:latin typeface="+mn-lt"/>
+              <a:ea typeface="+mn-ea"/>
+              <a:cs typeface="+mn-cs"/>
+            </a:endParaRPr>
+          </a:p>
+          <a:p>
+            <a:r>
+              <a:rPr lang="ru-RU" sz="1200" b="1" i="0" kern="1200" dirty="0" smtClean="0">
+                <a:solidFill>
+                  <a:schemeClr val="tx1"/>
+                </a:solidFill>
+                <a:effectLst/>
+                <a:latin typeface="+mn-lt"/>
+                <a:ea typeface="+mn-ea"/>
+                <a:cs typeface="+mn-cs"/>
+              </a:rPr>
+              <a:t>Строка</a:t>
+            </a:r>
+            <a:endParaRPr lang="en-US" sz="1200" b="1" i="0" kern="1200" dirty="0" smtClean="0">
+              <a:solidFill>
+                <a:schemeClr val="tx1"/>
+              </a:solidFill>
+              <a:effectLst/>
+              <a:latin typeface="+mn-lt"/>
+              <a:ea typeface="+mn-ea"/>
+              <a:cs typeface="+mn-cs"/>
+            </a:endParaRPr>
+          </a:p>
+          <a:p>
+            <a:r>
+              <a:rPr lang="en-US" sz="1200" b="0" i="1" kern="1200" dirty="0" smtClean="0">
+                <a:solidFill>
+                  <a:schemeClr val="tx1"/>
+                </a:solidFill>
+                <a:effectLst/>
+                <a:latin typeface="+mn-lt"/>
+                <a:ea typeface="+mn-ea"/>
+                <a:cs typeface="+mn-cs"/>
+              </a:rPr>
+              <a:t>TRUE, FALSE</a:t>
+            </a:r>
+            <a:endParaRPr lang="en-US" sz="1200" b="0" i="0" kern="1200" dirty="0" smtClean="0">
+              <a:solidFill>
+                <a:schemeClr val="tx1"/>
+              </a:solidFill>
+              <a:effectLst/>
+              <a:latin typeface="+mn-lt"/>
+              <a:ea typeface="+mn-ea"/>
+              <a:cs typeface="+mn-cs"/>
+            </a:endParaRPr>
+          </a:p>
+          <a:p>
+            <a:r>
+              <a:rPr lang="ru-RU" sz="1200" b="1" i="0" kern="1200" dirty="0" smtClean="0">
+                <a:solidFill>
+                  <a:schemeClr val="tx1"/>
+                </a:solidFill>
+                <a:effectLst/>
+                <a:latin typeface="+mn-lt"/>
+                <a:ea typeface="+mn-ea"/>
+                <a:cs typeface="+mn-cs"/>
+              </a:rPr>
+              <a:t>Массив</a:t>
+            </a:r>
+            <a:endParaRPr lang="en-US" sz="1200" b="1" i="0" kern="1200" dirty="0" smtClean="0">
+              <a:solidFill>
+                <a:schemeClr val="tx1"/>
+              </a:solidFill>
+              <a:effectLst/>
+              <a:latin typeface="+mn-lt"/>
+              <a:ea typeface="+mn-ea"/>
+              <a:cs typeface="+mn-cs"/>
+            </a:endParaRPr>
+          </a:p>
+          <a:p>
+            <a:r>
+              <a:rPr lang="en-US" sz="1200" b="1" i="0" kern="1200" dirty="0" smtClean="0">
+                <a:solidFill>
+                  <a:schemeClr val="tx1"/>
+                </a:solidFill>
+                <a:effectLst/>
+                <a:latin typeface="+mn-lt"/>
+                <a:ea typeface="+mn-ea"/>
+                <a:cs typeface="+mn-cs"/>
+              </a:rPr>
+              <a:t>JSON</a:t>
+            </a:r>
+            <a:endParaRPr lang="ru-RU" sz="1200" b="1" i="0" kern="1200" dirty="0" smtClean="0">
+              <a:solidFill>
+                <a:schemeClr val="tx1"/>
+              </a:solidFill>
+              <a:effectLst/>
+              <a:latin typeface="+mn-lt"/>
+              <a:ea typeface="+mn-ea"/>
+              <a:cs typeface="+mn-cs"/>
+            </a:endParaRPr>
+          </a:p>
+          <a:p>
+            <a:endParaRPr lang="ru-RU" sz="1200" b="0" i="0" kern="1200" dirty="0" smtClean="0">
+              <a:solidFill>
+                <a:schemeClr val="tx1"/>
+              </a:solidFill>
+              <a:effectLst/>
+              <a:latin typeface="+mn-lt"/>
+              <a:ea typeface="+mn-ea"/>
+              <a:cs typeface="+mn-cs"/>
+            </a:endParaRPr>
+          </a:p>
+          <a:p>
+            <a:r>
+              <a:rPr lang="en-US" sz="1200" b="0" i="0" kern="1200" dirty="0" smtClean="0">
+                <a:solidFill>
+                  <a:schemeClr val="tx1"/>
+                </a:solidFill>
+                <a:effectLst/>
+                <a:latin typeface="+mn-lt"/>
+                <a:ea typeface="+mn-ea"/>
+                <a:cs typeface="+mn-cs"/>
+              </a:rPr>
+              <a:t>JSON</a:t>
+            </a:r>
+            <a:r>
+              <a:rPr lang="ru-RU" sz="1200" b="0" i="0" kern="1200" baseline="0" dirty="0" smtClean="0">
+                <a:solidFill>
+                  <a:schemeClr val="tx1"/>
+                </a:solidFill>
+                <a:effectLst/>
+                <a:latin typeface="+mn-lt"/>
+                <a:ea typeface="+mn-ea"/>
+                <a:cs typeface="+mn-cs"/>
+              </a:rPr>
+              <a:t> мы будем использовать в наших веб приложениях, поэтому пару задачек на эту тему</a:t>
             </a:r>
             <a:endParaRPr lang="ru-RU" dirty="0"/>
           </a:p>
@@ -1614,7 +1622,207 @@
               <a:pPr>
                 <a:defRPr/>
               </a:pPr>
-              <a:t>16</a:t>
+              <a:t>17</a:t>
+            </a:fld>
+            <a:endParaRPr lang="ru-RU"/>
+          </a:p>
+        </p:txBody>
+      </p:sp>
+    </p:spTree>
+    <p:extLst>
+      <p:ext uri="{BB962C8B-B14F-4D97-AF65-F5344CB8AC3E}">
+        <p14:creationId xmlns:p14="http://schemas.microsoft.com/office/powerpoint/2010/main" val="813356846"/>
+      </p:ext>
+    </p:extLst>
+  </p:cSld>
+  <p:clrMapOvr>
+    <a:masterClrMapping/>
+  </p:clrMapOvr>
+</p:notes>
+</file>
+
+<file path=ppt/notesSlides/notesSlide5.xml><?xml version="1.0" encoding="utf-8"?>
+<p:notes xmlns:a="http://schemas.openxmlformats.org/drawingml/2006/main" xmlns:r="http://schemas.openxmlformats.org/officeDocument/2006/relationships" xmlns:p="http://schemas.openxmlformats.org/presentationml/2006/main">
+  <p:cSld>
+    <p:spTree>
+      <p:nvGrpSpPr>
+        <p:cNvPr id="1" name=""/>
+        <p:cNvGrpSpPr/>
+        <p:nvPr/>
+      </p:nvGrpSpPr>
+      <p:grpSpPr>
+        <a:xfrm>
+          <a:off x="0" y="0"/>
+          <a:ext cx="0" cy="0"/>
+          <a:chOff x="0" y="0"/>
+          <a:chExt cx="0" cy="0"/>
+        </a:xfrm>
+      </p:grpSpPr>
+      <p:sp>
+        <p:nvSpPr>
+          <p:cNvPr id="2" name="Образ слайда 1"/>
+          <p:cNvSpPr>
+            <a:spLocks noGrp="1" noRot="1" noChangeAspect="1"/>
+          </p:cNvSpPr>
+          <p:nvPr>
+            <p:ph type="sldImg"/>
+          </p:nvPr>
+        </p:nvSpPr>
+        <p:spPr/>
+      </p:sp>
+      <p:sp>
+        <p:nvSpPr>
+          <p:cNvPr id="3" name="Заметки 2"/>
+          <p:cNvSpPr>
+            <a:spLocks noGrp="1"/>
+          </p:cNvSpPr>
+          <p:nvPr>
+            <p:ph type="body" idx="1"/>
+          </p:nvPr>
+        </p:nvSpPr>
+        <p:spPr/>
+        <p:txBody>
+          <a:bodyPr/>
+          <a:lstStyle/>
+          <a:p>
+            <a:r>
+              <a:rPr lang="ru-RU" dirty="0" smtClean="0"/>
+              <a:t>Сохранять их где-то,</a:t>
+            </a:r>
+            <a:r>
+              <a:rPr lang="ru-RU" baseline="0" dirty="0" smtClean="0"/>
+              <a:t> они потом нужны будут</a:t>
+            </a:r>
+            <a:endParaRPr lang="ru-RU" dirty="0"/>
+          </a:p>
+        </p:txBody>
+      </p:sp>
+      <p:sp>
+        <p:nvSpPr>
+          <p:cNvPr id="4" name="Номер слайда 3"/>
+          <p:cNvSpPr>
+            <a:spLocks noGrp="1"/>
+          </p:cNvSpPr>
+          <p:nvPr>
+            <p:ph type="sldNum" sz="quarter" idx="10"/>
+          </p:nvPr>
+        </p:nvSpPr>
+        <p:spPr/>
+        <p:txBody>
+          <a:bodyPr/>
+          <a:lstStyle/>
+          <a:p>
+            <a:pPr>
+              <a:defRPr/>
+            </a:pPr>
+            <a:fld id="{DB2C8497-7A30-49CA-AF05-93FA02A474A9}" type="slidenum">
+              <a:rPr lang="ru-RU" smtClean="0"/>
+              <a:pPr>
+                <a:defRPr/>
+              </a:pPr>
+              <a:t>18</a:t>
+            </a:fld>
+            <a:endParaRPr lang="ru-RU"/>
+          </a:p>
+        </p:txBody>
+      </p:sp>
+    </p:spTree>
+    <p:extLst>
+      <p:ext uri="{BB962C8B-B14F-4D97-AF65-F5344CB8AC3E}">
+        <p14:creationId xmlns:p14="http://schemas.microsoft.com/office/powerpoint/2010/main" val="2743639933"/>
+      </p:ext>
+    </p:extLst>
+  </p:cSld>
+  <p:clrMapOvr>
+    <a:masterClrMapping/>
+  </p:clrMapOvr>
+</p:notes>
+</file>
+
+<file path=ppt/notesSlides/notesSlide6.xml><?xml version="1.0" encoding="utf-8"?>
+<p:notes xmlns:a="http://schemas.openxmlformats.org/drawingml/2006/main" xmlns:r="http://schemas.openxmlformats.org/officeDocument/2006/relationships" xmlns:p="http://schemas.openxmlformats.org/presentationml/2006/main">
+  <p:cSld>
+    <p:spTree>
+      <p:nvGrpSpPr>
+        <p:cNvPr id="1" name=""/>
+        <p:cNvGrpSpPr/>
+        <p:nvPr/>
+      </p:nvGrpSpPr>
+      <p:grpSpPr>
+        <a:xfrm>
+          <a:off x="0" y="0"/>
+          <a:ext cx="0" cy="0"/>
+          <a:chOff x="0" y="0"/>
+          <a:chExt cx="0" cy="0"/>
+        </a:xfrm>
+      </p:grpSpPr>
+      <p:sp>
+        <p:nvSpPr>
+          <p:cNvPr id="2" name="Образ слайда 1"/>
+          <p:cNvSpPr>
+            <a:spLocks noGrp="1" noRot="1" noChangeAspect="1"/>
+          </p:cNvSpPr>
+          <p:nvPr>
+            <p:ph type="sldImg"/>
+          </p:nvPr>
+        </p:nvSpPr>
+        <p:spPr/>
+      </p:sp>
+      <p:sp>
+        <p:nvSpPr>
+          <p:cNvPr id="3" name="Заметки 2"/>
+          <p:cNvSpPr>
+            <a:spLocks noGrp="1"/>
+          </p:cNvSpPr>
+          <p:nvPr>
+            <p:ph type="body" idx="1"/>
+          </p:nvPr>
+        </p:nvSpPr>
+        <p:spPr/>
+        <p:txBody>
+          <a:bodyPr/>
+          <a:lstStyle/>
+          <a:p>
+            <a:r>
+              <a:rPr lang="ru-RU" dirty="0" smtClean="0"/>
+              <a:t>По 1.</a:t>
+            </a:r>
+            <a:r>
+              <a:rPr lang="ru-RU" baseline="0" dirty="0" smtClean="0"/>
+              <a:t> Например, ключи: товар, количество, цена, артикул и </a:t>
+            </a:r>
+            <a:r>
+              <a:rPr lang="ru-RU" baseline="0" dirty="0" err="1" smtClean="0"/>
+              <a:t>тэдэ</a:t>
+            </a:r>
+            <a:endParaRPr lang="ru-RU" dirty="0"/>
+          </a:p>
+        </p:txBody>
+      </p:sp>
+      <p:sp>
+        <p:nvSpPr>
+          <p:cNvPr id="4" name="Номер слайда 3"/>
+          <p:cNvSpPr>
+            <a:spLocks noGrp="1"/>
+          </p:cNvSpPr>
+          <p:nvPr>
+            <p:ph type="sldNum" sz="quarter" idx="10"/>
+          </p:nvPr>
+        </p:nvSpPr>
+        <p:spPr/>
+        <p:txBody>
+          <a:bodyPr/>
+          <a:lstStyle/>
+          <a:p>
+            <a:pPr>
+              <a:defRPr/>
+            </a:pPr>
+            <a:fld id="{DB2C8497-7A30-49CA-AF05-93FA02A474A9}" type="slidenum">
+              <a:rPr lang="ru-RU" smtClean="0"/>
+              <a:pPr>
+                <a:defRPr/>
+              </a:pPr>
+              <a:t>19</a:t>
             </a:fld>
             <a:endParaRPr lang="ru-RU"/>
           </a:p>
@@ -2822,7 +3030,7 @@
               <a:pPr>
                 <a:defRPr/>
               </a:pPr>
-              <a:t>06.07.2018</a:t>
+              <a:t>09.07.2018</a:t>
             </a:fld>
             <a:endParaRPr lang="ru-RU"/>
           </a:p>
@@ -3852,6 +4060,13 @@
   <p:clrMapOvr>
     <a:masterClrMapping/>
   </p:clrMapOvr>
+  <p:timing>
+    <p:tnLst>
+      <p:par>
+        <p:cTn id="1" dur="indefinite" restart="never" nodeType="tmRoot"/>
+      </p:par>
+    </p:tnLst>
+  </p:timing>
 </p:sld>
 </file>
 
@@ -4237,6 +4452,13 @@
   <p:clrMapOvr>
     <a:masterClrMapping/>
   </p:clrMapOvr>
+  <p:timing>
+    <p:tnLst>
+      <p:par>
+        <p:cTn id="1" dur="indefinite" restart="never" nodeType="tmRoot"/>
+      </p:par>
+    </p:tnLst>
+  </p:timing>
 </p:sld>
 </file>
 
@@ -5000,6 +5222,13 @@
   <p:clrMapOvr>
     <a:masterClrMapping/>
   </p:clrMapOvr>
+  <p:timing>
+    <p:tnLst>
+      <p:par>
+        <p:cTn id="1" dur="indefinite" restart="never" nodeType="tmRoot"/>
+      </p:par>
+    </p:tnLst>
+  </p:timing>
 </p:sld>
 </file>
 
@@ -5307,8 +5536,28 @@
                 <a:latin typeface="Times New Roman" panose="02020603050405020304" pitchFamily="18" charset="0"/>
                 <a:cs typeface="Times New Roman" panose="02020603050405020304" pitchFamily="18" charset="0"/>
               </a:rPr>
-              <a:t>это протокол (алгоритмы и правила) передачи данных с сети интернет.</a:t>
-            </a:r>
+              <a:t>это протокол (алгоритмы и правила) передачи данных с сети интернет</a:t>
+            </a:r>
+            <a:r>
+              <a:rPr lang="ru-RU" sz="2000" dirty="0" smtClean="0">
+                <a:solidFill>
+                  <a:schemeClr val="tx1"/>
+                </a:solidFill>
+                <a:latin typeface="Times New Roman" panose="02020603050405020304" pitchFamily="18" charset="0"/>
+                <a:cs typeface="Times New Roman" panose="02020603050405020304" pitchFamily="18" charset="0"/>
+              </a:rPr>
+              <a:t>.</a:t>
+            </a:r>
+          </a:p>
+          <a:p>
+            <a:pPr indent="0" algn="just"/>
+            <a:endParaRPr lang="ru-RU" sz="2000" dirty="0" smtClean="0">
+              <a:solidFill>
+                <a:schemeClr val="tx1"/>
+              </a:solidFill>
+              <a:latin typeface="Times New Roman" panose="02020603050405020304" pitchFamily="18" charset="0"/>
+              <a:cs typeface="Times New Roman" panose="02020603050405020304" pitchFamily="18" charset="0"/>
+            </a:endParaRPr>
           </a:p>
           <a:p>
             <a:pPr indent="0" algn="just"/>
@@ -5372,56 +5621,6 @@
               <a:t>-методы</a:t>
             </a:r>
             <a:endParaRPr lang="en-US" sz="2000" dirty="0" smtClean="0">
-              <a:solidFill>
-                <a:schemeClr val="tx1"/>
-              </a:solidFill>
-              <a:latin typeface="Times New Roman" panose="02020603050405020304" pitchFamily="18" charset="0"/>
-              <a:cs typeface="Times New Roman" panose="02020603050405020304" pitchFamily="18" charset="0"/>
-            </a:endParaRPr>
-          </a:p>
-          <a:p>
-            <a:pPr indent="0" algn="just"/>
-            <a:endParaRPr lang="en-US" sz="2000" dirty="0" smtClean="0">
-              <a:solidFill>
-                <a:schemeClr val="tx1"/>
-              </a:solidFill>
-              <a:latin typeface="Times New Roman" panose="02020603050405020304" pitchFamily="18" charset="0"/>
-              <a:cs typeface="Times New Roman" panose="02020603050405020304" pitchFamily="18" charset="0"/>
-            </a:endParaRPr>
-          </a:p>
-          <a:p>
-            <a:pPr indent="0" algn="just"/>
-            <a:r>
-              <a:rPr lang="ru-RU" sz="2000" dirty="0" smtClean="0">
-                <a:solidFill>
-                  <a:schemeClr val="tx1"/>
-                </a:solidFill>
-                <a:latin typeface="Times New Roman" panose="02020603050405020304" pitchFamily="18" charset="0"/>
-                <a:cs typeface="Times New Roman" panose="02020603050405020304" pitchFamily="18" charset="0"/>
-              </a:rPr>
-              <a:t>Когда различные документы</a:t>
-            </a:r>
-            <a:r>
-              <a:rPr lang="en-US" sz="2000" dirty="0" smtClean="0">
-                <a:solidFill>
-                  <a:schemeClr val="tx1"/>
-                </a:solidFill>
-                <a:latin typeface="Times New Roman" panose="02020603050405020304" pitchFamily="18" charset="0"/>
-                <a:cs typeface="Times New Roman" panose="02020603050405020304" pitchFamily="18" charset="0"/>
-              </a:rPr>
-              <a:t>/</a:t>
-            </a:r>
-            <a:r>
-              <a:rPr lang="ru-RU" sz="2000" dirty="0" smtClean="0">
-                <a:solidFill>
-                  <a:schemeClr val="tx1"/>
-                </a:solidFill>
-                <a:latin typeface="Times New Roman" panose="02020603050405020304" pitchFamily="18" charset="0"/>
-                <a:cs typeface="Times New Roman" panose="02020603050405020304" pitchFamily="18" charset="0"/>
-              </a:rPr>
-              <a:t>информация передается по сети, по мимо самого документа, необходимо передать</a:t>
-            </a:r>
-            <a:endParaRPr lang="en-US" sz="2000" dirty="0">
               <a:solidFill>
                 <a:schemeClr val="tx1"/>
               </a:solidFill>
@@ -5441,10 +5640,2227 @@
   <p:clrMapOvr>
     <a:masterClrMapping/>
   </p:clrMapOvr>
+  <p:timing>
+    <p:tnLst>
+      <p:par>
+        <p:cTn id="1" dur="indefinite" restart="never" nodeType="tmRoot"/>
+      </p:par>
+    </p:tnLst>
+  </p:timing>
 </p:sld>
 </file>
 
 <file path=ppt/slides/slide14.xml><?xml version="1.0" encoding="utf-8"?>
+<p:sld xmlns:a="http://schemas.openxmlformats.org/drawingml/2006/main" xmlns:r="http://schemas.openxmlformats.org/officeDocument/2006/relationships" xmlns:p="http://schemas.openxmlformats.org/presentationml/2006/main">
+  <p:cSld>
+    <p:spTree>
+      <p:nvGrpSpPr>
+        <p:cNvPr id="1" name=""/>
+        <p:cNvGrpSpPr/>
+        <p:nvPr/>
+      </p:nvGrpSpPr>
+      <p:grpSpPr>
+        <a:xfrm>
+          <a:off x="0" y="0"/>
+          <a:ext cx="0" cy="0"/>
+          <a:chOff x="0" y="0"/>
+          <a:chExt cx="0" cy="0"/>
+        </a:xfrm>
+      </p:grpSpPr>
+      <p:sp>
+        <p:nvSpPr>
+          <p:cNvPr id="3" name="Заголовок 2"/>
+          <p:cNvSpPr>
+            <a:spLocks noGrp="1"/>
+          </p:cNvSpPr>
+          <p:nvPr>
+            <p:ph type="title"/>
+          </p:nvPr>
+        </p:nvSpPr>
+        <p:spPr/>
+        <p:txBody>
+          <a:bodyPr/>
+          <a:lstStyle/>
+          <a:p>
+            <a:r>
+              <a:rPr lang="en-US" dirty="0" smtClean="0"/>
+              <a:t>HTTP-</a:t>
+            </a:r>
+            <a:r>
+              <a:rPr lang="ru-RU" dirty="0" smtClean="0"/>
+              <a:t>заголовки</a:t>
+            </a:r>
+            <a:endParaRPr lang="ru-RU" dirty="0"/>
+          </a:p>
+        </p:txBody>
+      </p:sp>
+      <p:sp>
+        <p:nvSpPr>
+          <p:cNvPr id="4" name="Текст 3">
+            <a:extLst>
+              <a:ext uri="{FF2B5EF4-FFF2-40B4-BE49-F238E27FC236}">
+                <a16:creationId xmlns:a16="http://schemas.microsoft.com/office/drawing/2014/main" id="{74C82C9C-F2A8-41A8-880B-73811E3EFC36}"/>
+              </a:ext>
+            </a:extLst>
+          </p:cNvPr>
+          <p:cNvSpPr>
+            <a:spLocks noGrp="1"/>
+          </p:cNvSpPr>
+          <p:nvPr>
+            <p:ph type="body" sz="quarter" idx="11"/>
+          </p:nvPr>
+        </p:nvSpPr>
+        <p:spPr>
+          <a:xfrm>
+            <a:off x="253096" y="6534445"/>
+            <a:ext cx="8602515" cy="323557"/>
+          </a:xfrm>
+        </p:spPr>
+        <p:txBody>
+          <a:bodyPr/>
+          <a:lstStyle/>
+          <a:p>
+            <a:endParaRPr lang="ru-RU" dirty="0"/>
+          </a:p>
+        </p:txBody>
+      </p:sp>
+      <p:sp>
+        <p:nvSpPr>
+          <p:cNvPr id="5" name="Текст 3">
+            <a:extLst>
+              <a:ext uri="{FF2B5EF4-FFF2-40B4-BE49-F238E27FC236}">
+                <a16:creationId xmlns:a16="http://schemas.microsoft.com/office/drawing/2014/main" id="{74C82C9C-F2A8-41A8-880B-73811E3EFC36}"/>
+              </a:ext>
+            </a:extLst>
+          </p:cNvPr>
+          <p:cNvSpPr txBox="1">
+            <a:spLocks/>
+          </p:cNvSpPr>
+          <p:nvPr/>
+        </p:nvSpPr>
+        <p:spPr bwMode="auto">
+          <a:xfrm>
+            <a:off x="253096" y="1332411"/>
+            <a:ext cx="8676895" cy="4763589"/>
+          </a:xfrm>
+          <a:prstGeom prst="rect">
+            <a:avLst/>
+          </a:prstGeom>
+          <a:noFill/>
+          <a:ln>
+            <a:noFill/>
+          </a:ln>
+          <a:extLst>
+            <a:ext uri="{909E8E84-426E-40DD-AFC4-6F175D3DCCD1}">
+              <a14:hiddenFill xmlns:a14="http://schemas.microsoft.com/office/drawing/2010/main">
+                <a:solidFill>
+                  <a:srgbClr val="FFFFFF"/>
+                </a:solidFill>
+              </a14:hiddenFill>
+            </a:ext>
+            <a:ext uri="{91240B29-F687-4F45-9708-019B960494DF}">
+              <a14:hiddenLine xmlns:a14="http://schemas.microsoft.com/office/drawing/2010/main" w="9525">
+                <a:solidFill>
+                  <a:srgbClr val="000000"/>
+                </a:solidFill>
+                <a:miter lim="800000"/>
+                <a:headEnd/>
+                <a:tailEnd/>
+              </a14:hiddenLine>
+            </a:ext>
+          </a:extLst>
+        </p:spPr>
+        <p:txBody>
+          <a:bodyPr vert="horz" wrap="square" lIns="91440" tIns="45720" rIns="91440" bIns="45720" numCol="1" anchor="t" anchorCtr="0" compatLnSpc="1">
+            <a:prstTxWarp prst="textNoShape">
+              <a:avLst/>
+            </a:prstTxWarp>
+            <a:normAutofit fontScale="92500" lnSpcReduction="20000"/>
+          </a:bodyPr>
+          <a:lstStyle>
+            <a:lvl1pPr marL="0" marR="0" indent="-342900" algn="l" defTabSz="180000" rtl="0" eaLnBrk="1" fontAlgn="auto" latinLnBrk="0" hangingPunct="1">
+              <a:lnSpc>
+                <a:spcPct val="100000"/>
+              </a:lnSpc>
+              <a:spcBef>
+                <a:spcPct val="20000"/>
+              </a:spcBef>
+              <a:spcAft>
+                <a:spcPts val="0"/>
+              </a:spcAft>
+              <a:buClrTx/>
+              <a:buSzTx/>
+              <a:buFont typeface="Arial" pitchFamily="34" charset="0"/>
+              <a:buNone/>
+              <a:tabLst/>
+              <a:defRPr sz="900" kern="1200">
+                <a:solidFill>
+                  <a:schemeClr val="tx1">
+                    <a:lumMod val="50000"/>
+                    <a:lumOff val="50000"/>
+                  </a:schemeClr>
+                </a:solidFill>
+                <a:latin typeface="Arial" pitchFamily="34" charset="0"/>
+                <a:ea typeface="+mn-ea"/>
+                <a:cs typeface="Arial" pitchFamily="34" charset="0"/>
+              </a:defRPr>
+            </a:lvl1pPr>
+            <a:lvl2pPr marL="742950" indent="-285750" algn="l" rtl="0" eaLnBrk="0" fontAlgn="base" hangingPunct="0">
+              <a:spcBef>
+                <a:spcPct val="20000"/>
+              </a:spcBef>
+              <a:spcAft>
+                <a:spcPct val="0"/>
+              </a:spcAft>
+              <a:buFont typeface="Arial" charset="0"/>
+              <a:buChar char="–"/>
+              <a:defRPr sz="2800" kern="1200">
+                <a:solidFill>
+                  <a:schemeClr val="tx1"/>
+                </a:solidFill>
+                <a:latin typeface="+mn-lt"/>
+                <a:ea typeface="+mn-ea"/>
+                <a:cs typeface="+mn-cs"/>
+              </a:defRPr>
+            </a:lvl2pPr>
+            <a:lvl3pPr marL="1143000" indent="-228600" algn="l" rtl="0" eaLnBrk="0" fontAlgn="base" hangingPunct="0">
+              <a:spcBef>
+                <a:spcPct val="20000"/>
+              </a:spcBef>
+              <a:spcAft>
+                <a:spcPct val="0"/>
+              </a:spcAft>
+              <a:buFont typeface="Arial" charset="0"/>
+              <a:buChar char="•"/>
+              <a:defRPr sz="2400" kern="1200">
+                <a:solidFill>
+                  <a:schemeClr val="tx1"/>
+                </a:solidFill>
+                <a:latin typeface="+mn-lt"/>
+                <a:ea typeface="+mn-ea"/>
+                <a:cs typeface="+mn-cs"/>
+              </a:defRPr>
+            </a:lvl3pPr>
+            <a:lvl4pPr marL="1600200" indent="-228600" algn="l" rtl="0" eaLnBrk="0" fontAlgn="base" hangingPunct="0">
+              <a:spcBef>
+                <a:spcPct val="20000"/>
+              </a:spcBef>
+              <a:spcAft>
+                <a:spcPct val="0"/>
+              </a:spcAft>
+              <a:buFont typeface="Arial" charset="0"/>
+              <a:buChar char="–"/>
+              <a:defRPr sz="2000" kern="1200">
+                <a:solidFill>
+                  <a:schemeClr val="tx1"/>
+                </a:solidFill>
+                <a:latin typeface="+mn-lt"/>
+                <a:ea typeface="+mn-ea"/>
+                <a:cs typeface="+mn-cs"/>
+              </a:defRPr>
+            </a:lvl4pPr>
+            <a:lvl5pPr marL="2057400" indent="-228600" algn="l" rtl="0" eaLnBrk="0" fontAlgn="base" hangingPunct="0">
+              <a:spcBef>
+                <a:spcPct val="20000"/>
+              </a:spcBef>
+              <a:spcAft>
+                <a:spcPct val="0"/>
+              </a:spcAft>
+              <a:buFont typeface="Arial" charset="0"/>
+              <a:buChar char="»"/>
+              <a:defRPr sz="2000" kern="1200">
+                <a:solidFill>
+                  <a:schemeClr val="tx1"/>
+                </a:solidFill>
+                <a:latin typeface="+mn-lt"/>
+                <a:ea typeface="+mn-ea"/>
+                <a:cs typeface="+mn-cs"/>
+              </a:defRPr>
+            </a:lvl5pPr>
+            <a:lvl6pPr marL="2514600" indent="-228600" algn="l" defTabSz="914400" rtl="0" eaLnBrk="1" latinLnBrk="0" hangingPunct="1">
+              <a:spcBef>
+                <a:spcPct val="20000"/>
+              </a:spcBef>
+              <a:buFont typeface="Arial" pitchFamily="34" charset="0"/>
+              <a:buChar char="•"/>
+              <a:defRPr sz="2000" kern="1200">
+                <a:solidFill>
+                  <a:schemeClr val="tx1"/>
+                </a:solidFill>
+                <a:latin typeface="+mn-lt"/>
+                <a:ea typeface="+mn-ea"/>
+                <a:cs typeface="+mn-cs"/>
+              </a:defRPr>
+            </a:lvl6pPr>
+            <a:lvl7pPr marL="2971800" indent="-228600" algn="l" defTabSz="914400" rtl="0" eaLnBrk="1" latinLnBrk="0" hangingPunct="1">
+              <a:spcBef>
+                <a:spcPct val="20000"/>
+              </a:spcBef>
+              <a:buFont typeface="Arial" pitchFamily="34" charset="0"/>
+              <a:buChar char="•"/>
+              <a:defRPr sz="2000" kern="1200">
+                <a:solidFill>
+                  <a:schemeClr val="tx1"/>
+                </a:solidFill>
+                <a:latin typeface="+mn-lt"/>
+                <a:ea typeface="+mn-ea"/>
+                <a:cs typeface="+mn-cs"/>
+              </a:defRPr>
+            </a:lvl7pPr>
+            <a:lvl8pPr marL="3429000" indent="-228600" algn="l" defTabSz="914400" rtl="0" eaLnBrk="1" latinLnBrk="0" hangingPunct="1">
+              <a:spcBef>
+                <a:spcPct val="20000"/>
+              </a:spcBef>
+              <a:buFont typeface="Arial" pitchFamily="34" charset="0"/>
+              <a:buChar char="•"/>
+              <a:defRPr sz="2000" kern="1200">
+                <a:solidFill>
+                  <a:schemeClr val="tx1"/>
+                </a:solidFill>
+                <a:latin typeface="+mn-lt"/>
+                <a:ea typeface="+mn-ea"/>
+                <a:cs typeface="+mn-cs"/>
+              </a:defRPr>
+            </a:lvl8pPr>
+            <a:lvl9pPr marL="3886200" indent="-228600" algn="l" defTabSz="914400" rtl="0" eaLnBrk="1" latinLnBrk="0" hangingPunct="1">
+              <a:spcBef>
+                <a:spcPct val="20000"/>
+              </a:spcBef>
+              <a:buFont typeface="Arial" pitchFamily="34" charset="0"/>
+              <a:buChar char="•"/>
+              <a:defRPr sz="2000" kern="1200">
+                <a:solidFill>
+                  <a:schemeClr val="tx1"/>
+                </a:solidFill>
+                <a:latin typeface="+mn-lt"/>
+                <a:ea typeface="+mn-ea"/>
+                <a:cs typeface="+mn-cs"/>
+              </a:defRPr>
+            </a:lvl9pPr>
+          </a:lstStyle>
+          <a:p>
+            <a:pPr indent="0" algn="just"/>
+            <a:r>
+              <a:rPr lang="ru-RU" sz="2000" dirty="0">
+                <a:solidFill>
+                  <a:schemeClr val="tx1"/>
+                </a:solidFill>
+                <a:latin typeface="Times New Roman" panose="02020603050405020304" pitchFamily="18" charset="0"/>
+                <a:cs typeface="Times New Roman" panose="02020603050405020304" pitchFamily="18" charset="0"/>
+              </a:rPr>
+              <a:t>Заголовки HTTP </a:t>
+            </a:r>
+            <a:r>
+              <a:rPr lang="ru-RU" sz="2000" dirty="0" smtClean="0">
+                <a:solidFill>
+                  <a:schemeClr val="tx1"/>
+                </a:solidFill>
+                <a:latin typeface="Times New Roman" panose="02020603050405020304" pitchFamily="18" charset="0"/>
+                <a:cs typeface="Times New Roman" panose="02020603050405020304" pitchFamily="18" charset="0"/>
+              </a:rPr>
+              <a:t>- важная </a:t>
+            </a:r>
+            <a:r>
+              <a:rPr lang="ru-RU" sz="2000" dirty="0">
+                <a:solidFill>
+                  <a:schemeClr val="tx1"/>
+                </a:solidFill>
+                <a:latin typeface="Times New Roman" panose="02020603050405020304" pitchFamily="18" charset="0"/>
+                <a:cs typeface="Times New Roman" panose="02020603050405020304" pitchFamily="18" charset="0"/>
+              </a:rPr>
+              <a:t>часть </a:t>
+            </a:r>
+            <a:r>
+              <a:rPr lang="ru-RU" sz="2000" dirty="0" smtClean="0">
+                <a:solidFill>
+                  <a:schemeClr val="tx1"/>
+                </a:solidFill>
+                <a:latin typeface="Times New Roman" panose="02020603050405020304" pitchFamily="18" charset="0"/>
+                <a:cs typeface="Times New Roman" panose="02020603050405020304" pitchFamily="18" charset="0"/>
+              </a:rPr>
+              <a:t>при передаче данных по протоколу </a:t>
+            </a:r>
+            <a:r>
+              <a:rPr lang="en-US" sz="2000" dirty="0" smtClean="0">
+                <a:solidFill>
+                  <a:schemeClr val="tx1"/>
+                </a:solidFill>
+                <a:latin typeface="Times New Roman" panose="02020603050405020304" pitchFamily="18" charset="0"/>
+                <a:cs typeface="Times New Roman" panose="02020603050405020304" pitchFamily="18" charset="0"/>
+              </a:rPr>
+              <a:t>http</a:t>
+            </a:r>
+            <a:r>
+              <a:rPr lang="ru-RU" sz="2000" dirty="0" smtClean="0">
+                <a:solidFill>
+                  <a:schemeClr val="tx1"/>
+                </a:solidFill>
+                <a:latin typeface="Times New Roman" panose="02020603050405020304" pitchFamily="18" charset="0"/>
+                <a:cs typeface="Times New Roman" panose="02020603050405020304" pitchFamily="18" charset="0"/>
+              </a:rPr>
+              <a:t>. </a:t>
+            </a:r>
+            <a:r>
+              <a:rPr lang="ru-RU" sz="2000" dirty="0">
+                <a:solidFill>
+                  <a:schemeClr val="tx1"/>
+                </a:solidFill>
+                <a:latin typeface="Times New Roman" panose="02020603050405020304" pitchFamily="18" charset="0"/>
+                <a:cs typeface="Times New Roman" panose="02020603050405020304" pitchFamily="18" charset="0"/>
+              </a:rPr>
+              <a:t>С их помощью между сервером и клиентом происходит обмен служебной информацией, которая не видна пользователю, но </a:t>
+            </a:r>
+            <a:r>
+              <a:rPr lang="ru-RU" sz="2000" dirty="0" smtClean="0">
+                <a:solidFill>
+                  <a:schemeClr val="tx1"/>
+                </a:solidFill>
+                <a:latin typeface="Times New Roman" panose="02020603050405020304" pitchFamily="18" charset="0"/>
+                <a:cs typeface="Times New Roman" panose="02020603050405020304" pitchFamily="18" charset="0"/>
+              </a:rPr>
+              <a:t>необходима </a:t>
+            </a:r>
+            <a:r>
+              <a:rPr lang="ru-RU" sz="2000" dirty="0">
+                <a:solidFill>
+                  <a:schemeClr val="tx1"/>
+                </a:solidFill>
+                <a:latin typeface="Times New Roman" panose="02020603050405020304" pitchFamily="18" charset="0"/>
+                <a:cs typeface="Times New Roman" panose="02020603050405020304" pitchFamily="18" charset="0"/>
+              </a:rPr>
+              <a:t>для правильной </a:t>
+            </a:r>
+            <a:r>
+              <a:rPr lang="ru-RU" sz="2000" dirty="0" smtClean="0">
+                <a:solidFill>
+                  <a:schemeClr val="tx1"/>
+                </a:solidFill>
+                <a:latin typeface="Times New Roman" panose="02020603050405020304" pitchFamily="18" charset="0"/>
+                <a:cs typeface="Times New Roman" panose="02020603050405020304" pitchFamily="18" charset="0"/>
+              </a:rPr>
+              <a:t>работы. </a:t>
+            </a:r>
+          </a:p>
+          <a:p>
+            <a:pPr indent="0" algn="just"/>
+            <a:r>
+              <a:rPr lang="ru-RU" sz="2000" dirty="0" smtClean="0">
+                <a:solidFill>
+                  <a:schemeClr val="tx1"/>
+                </a:solidFill>
+                <a:latin typeface="Times New Roman" panose="02020603050405020304" pitchFamily="18" charset="0"/>
+                <a:cs typeface="Times New Roman" panose="02020603050405020304" pitchFamily="18" charset="0"/>
+              </a:rPr>
+              <a:t>Формат заголовков - </a:t>
+            </a:r>
+            <a:r>
+              <a:rPr lang="ru-RU" sz="2000" b="1" dirty="0" smtClean="0">
+                <a:solidFill>
+                  <a:schemeClr val="tx1"/>
+                </a:solidFill>
+                <a:latin typeface="Times New Roman" panose="02020603050405020304" pitchFamily="18" charset="0"/>
+                <a:cs typeface="Times New Roman" panose="02020603050405020304" pitchFamily="18" charset="0"/>
+              </a:rPr>
+              <a:t>НАЗВАНИЕ: ЗНАЧЕНИЕ</a:t>
+            </a:r>
+            <a:endParaRPr lang="en-US" sz="2000" b="1" dirty="0" smtClean="0">
+              <a:solidFill>
+                <a:schemeClr val="tx1"/>
+              </a:solidFill>
+              <a:latin typeface="Times New Roman" panose="02020603050405020304" pitchFamily="18" charset="0"/>
+              <a:cs typeface="Times New Roman" panose="02020603050405020304" pitchFamily="18" charset="0"/>
+            </a:endParaRPr>
+          </a:p>
+          <a:p>
+            <a:pPr indent="0" algn="just"/>
+            <a:endParaRPr lang="ru-RU" sz="2000" dirty="0" smtClean="0">
+              <a:solidFill>
+                <a:schemeClr val="tx1"/>
+              </a:solidFill>
+              <a:latin typeface="Times New Roman" panose="02020603050405020304" pitchFamily="18" charset="0"/>
+              <a:cs typeface="Times New Roman" panose="02020603050405020304" pitchFamily="18" charset="0"/>
+            </a:endParaRPr>
+          </a:p>
+          <a:p>
+            <a:pPr indent="0" algn="just"/>
+            <a:r>
+              <a:rPr lang="ru-RU" sz="2000" u="sng" dirty="0" smtClean="0">
+                <a:solidFill>
+                  <a:schemeClr val="tx1"/>
+                </a:solidFill>
+                <a:latin typeface="Times New Roman" panose="02020603050405020304" pitchFamily="18" charset="0"/>
+                <a:cs typeface="Times New Roman" panose="02020603050405020304" pitchFamily="18" charset="0"/>
+              </a:rPr>
+              <a:t>Пример:</a:t>
+            </a:r>
+          </a:p>
+          <a:p>
+            <a:pPr indent="0" algn="just"/>
+            <a:r>
+              <a:rPr lang="en-US" sz="2000" dirty="0">
+                <a:solidFill>
+                  <a:schemeClr val="tx1"/>
+                </a:solidFill>
+                <a:latin typeface="Times New Roman" panose="02020603050405020304" pitchFamily="18" charset="0"/>
+                <a:cs typeface="Times New Roman" panose="02020603050405020304" pitchFamily="18" charset="0"/>
+              </a:rPr>
+              <a:t>GET /tutorials/other/top-20-mysql-best-practices/ </a:t>
+            </a:r>
+            <a:r>
+              <a:rPr lang="en-US" sz="2000" dirty="0" smtClean="0">
+                <a:solidFill>
+                  <a:schemeClr val="tx1"/>
+                </a:solidFill>
+                <a:latin typeface="Times New Roman" panose="02020603050405020304" pitchFamily="18" charset="0"/>
+                <a:cs typeface="Times New Roman" panose="02020603050405020304" pitchFamily="18" charset="0"/>
+              </a:rPr>
+              <a:t>HTTP/1.1</a:t>
+            </a:r>
+            <a:r>
+              <a:rPr lang="ru-RU" sz="2000" dirty="0" smtClean="0">
+                <a:solidFill>
+                  <a:schemeClr val="tx1"/>
+                </a:solidFill>
+                <a:latin typeface="Times New Roman" panose="02020603050405020304" pitchFamily="18" charset="0"/>
+                <a:cs typeface="Times New Roman" panose="02020603050405020304" pitchFamily="18" charset="0"/>
+              </a:rPr>
+              <a:t> –</a:t>
+            </a:r>
+          </a:p>
+          <a:p>
+            <a:pPr indent="0" algn="just"/>
+            <a:r>
+              <a:rPr lang="en-US" sz="2000" dirty="0" smtClean="0">
+                <a:solidFill>
+                  <a:schemeClr val="tx1"/>
+                </a:solidFill>
+                <a:latin typeface="Times New Roman" panose="02020603050405020304" pitchFamily="18" charset="0"/>
+                <a:cs typeface="Times New Roman" panose="02020603050405020304" pitchFamily="18" charset="0"/>
+              </a:rPr>
+              <a:t>Host</a:t>
+            </a:r>
+            <a:r>
+              <a:rPr lang="en-US" sz="2000" dirty="0">
+                <a:solidFill>
+                  <a:schemeClr val="tx1"/>
+                </a:solidFill>
+                <a:latin typeface="Times New Roman" panose="02020603050405020304" pitchFamily="18" charset="0"/>
+                <a:cs typeface="Times New Roman" panose="02020603050405020304" pitchFamily="18" charset="0"/>
+              </a:rPr>
+              <a:t>: net.tutsplus.com –</a:t>
+            </a:r>
+            <a:r>
+              <a:rPr lang="ru-RU" sz="2000" dirty="0" smtClean="0">
+                <a:solidFill>
+                  <a:schemeClr val="tx1"/>
+                </a:solidFill>
+                <a:latin typeface="Times New Roman" panose="02020603050405020304" pitchFamily="18" charset="0"/>
+                <a:cs typeface="Times New Roman" panose="02020603050405020304" pitchFamily="18" charset="0"/>
+              </a:rPr>
+              <a:t> </a:t>
+            </a:r>
+            <a:r>
+              <a:rPr lang="ru-RU" sz="2000" i="1" dirty="0" smtClean="0">
+                <a:solidFill>
+                  <a:schemeClr val="tx1"/>
+                </a:solidFill>
+                <a:latin typeface="Times New Roman" panose="02020603050405020304" pitchFamily="18" charset="0"/>
+                <a:cs typeface="Times New Roman" panose="02020603050405020304" pitchFamily="18" charset="0"/>
+              </a:rPr>
+              <a:t>адрес машины  </a:t>
+            </a:r>
+            <a:r>
+              <a:rPr lang="ru-RU" sz="2000" dirty="0" smtClean="0">
+                <a:solidFill>
+                  <a:schemeClr val="tx1"/>
+                </a:solidFill>
+                <a:latin typeface="Times New Roman" panose="02020603050405020304" pitchFamily="18" charset="0"/>
+                <a:cs typeface="Times New Roman" panose="02020603050405020304" pitchFamily="18" charset="0"/>
+              </a:rPr>
+              <a:t>                                                   </a:t>
+            </a:r>
+          </a:p>
+          <a:p>
+            <a:pPr indent="0" algn="just"/>
+            <a:r>
+              <a:rPr lang="en-US" sz="2000" dirty="0" smtClean="0">
+                <a:solidFill>
+                  <a:schemeClr val="tx1"/>
+                </a:solidFill>
+                <a:latin typeface="Times New Roman" panose="02020603050405020304" pitchFamily="18" charset="0"/>
+                <a:cs typeface="Times New Roman" panose="02020603050405020304" pitchFamily="18" charset="0"/>
+              </a:rPr>
+              <a:t>User-Agent</a:t>
+            </a:r>
+            <a:r>
+              <a:rPr lang="en-US" sz="2000" dirty="0">
+                <a:solidFill>
+                  <a:schemeClr val="tx1"/>
+                </a:solidFill>
+                <a:latin typeface="Times New Roman" panose="02020603050405020304" pitchFamily="18" charset="0"/>
+                <a:cs typeface="Times New Roman" panose="02020603050405020304" pitchFamily="18" charset="0"/>
+              </a:rPr>
+              <a:t>: </a:t>
+            </a:r>
+            <a:r>
+              <a:rPr lang="en-US" sz="2000" dirty="0" smtClean="0">
+                <a:solidFill>
+                  <a:schemeClr val="tx1"/>
+                </a:solidFill>
+                <a:latin typeface="Times New Roman" panose="02020603050405020304" pitchFamily="18" charset="0"/>
+                <a:cs typeface="Times New Roman" panose="02020603050405020304" pitchFamily="18" charset="0"/>
+              </a:rPr>
+              <a:t>Mozilla/5.0 – </a:t>
+            </a:r>
+            <a:r>
+              <a:rPr lang="ru-RU" sz="2000" i="1" dirty="0" smtClean="0">
+                <a:solidFill>
+                  <a:schemeClr val="tx1"/>
+                </a:solidFill>
+                <a:latin typeface="Times New Roman" panose="02020603050405020304" pitchFamily="18" charset="0"/>
+                <a:cs typeface="Times New Roman" panose="02020603050405020304" pitchFamily="18" charset="0"/>
+              </a:rPr>
+              <a:t>программное обеспечение клиента</a:t>
+            </a:r>
+          </a:p>
+          <a:p>
+            <a:pPr indent="0" algn="just"/>
+            <a:r>
+              <a:rPr lang="en-US" sz="2000" dirty="0" smtClean="0">
+                <a:solidFill>
+                  <a:schemeClr val="tx1"/>
+                </a:solidFill>
+                <a:latin typeface="Times New Roman" panose="02020603050405020304" pitchFamily="18" charset="0"/>
+                <a:cs typeface="Times New Roman" panose="02020603050405020304" pitchFamily="18" charset="0"/>
+              </a:rPr>
+              <a:t>Accept</a:t>
+            </a:r>
+            <a:r>
+              <a:rPr lang="en-US" sz="2000" dirty="0">
+                <a:solidFill>
+                  <a:schemeClr val="tx1"/>
+                </a:solidFill>
+                <a:latin typeface="Times New Roman" panose="02020603050405020304" pitchFamily="18" charset="0"/>
+                <a:cs typeface="Times New Roman" panose="02020603050405020304" pitchFamily="18" charset="0"/>
+              </a:rPr>
+              <a:t>: </a:t>
+            </a:r>
+            <a:r>
+              <a:rPr lang="en-US" sz="2000" dirty="0" smtClean="0">
+                <a:solidFill>
+                  <a:schemeClr val="tx1"/>
+                </a:solidFill>
+                <a:latin typeface="Times New Roman" panose="02020603050405020304" pitchFamily="18" charset="0"/>
+                <a:cs typeface="Times New Roman" panose="02020603050405020304" pitchFamily="18" charset="0"/>
+              </a:rPr>
+              <a:t>text/html,</a:t>
+            </a:r>
+            <a:r>
+              <a:rPr lang="ru-RU" sz="2000" dirty="0">
+                <a:solidFill>
+                  <a:schemeClr val="tx1"/>
+                </a:solidFill>
+                <a:latin typeface="Times New Roman" panose="02020603050405020304" pitchFamily="18" charset="0"/>
+                <a:cs typeface="Times New Roman" panose="02020603050405020304" pitchFamily="18" charset="0"/>
+              </a:rPr>
+              <a:t> </a:t>
+            </a:r>
+            <a:r>
+              <a:rPr lang="en-US" sz="2000" dirty="0" smtClean="0">
+                <a:solidFill>
+                  <a:schemeClr val="tx1"/>
+                </a:solidFill>
+                <a:latin typeface="Times New Roman" panose="02020603050405020304" pitchFamily="18" charset="0"/>
+                <a:cs typeface="Times New Roman" panose="02020603050405020304" pitchFamily="18" charset="0"/>
+              </a:rPr>
+              <a:t>application/</a:t>
+            </a:r>
+            <a:r>
+              <a:rPr lang="en-US" sz="2000" dirty="0" err="1" smtClean="0">
+                <a:solidFill>
+                  <a:schemeClr val="tx1"/>
+                </a:solidFill>
+                <a:latin typeface="Times New Roman" panose="02020603050405020304" pitchFamily="18" charset="0"/>
+                <a:cs typeface="Times New Roman" panose="02020603050405020304" pitchFamily="18" charset="0"/>
+              </a:rPr>
+              <a:t>json</a:t>
+            </a:r>
+            <a:r>
+              <a:rPr lang="en-US" sz="2000" dirty="0" smtClean="0">
+                <a:solidFill>
+                  <a:schemeClr val="tx1"/>
+                </a:solidFill>
+                <a:latin typeface="Times New Roman" panose="02020603050405020304" pitchFamily="18" charset="0"/>
+                <a:cs typeface="Times New Roman" panose="02020603050405020304" pitchFamily="18" charset="0"/>
+              </a:rPr>
+              <a:t> – </a:t>
+            </a:r>
+            <a:r>
+              <a:rPr lang="ru-RU" sz="2000" i="1" dirty="0" smtClean="0">
+                <a:solidFill>
+                  <a:schemeClr val="tx1"/>
+                </a:solidFill>
+                <a:latin typeface="Times New Roman" panose="02020603050405020304" pitchFamily="18" charset="0"/>
+                <a:cs typeface="Times New Roman" panose="02020603050405020304" pitchFamily="18" charset="0"/>
+              </a:rPr>
+              <a:t>список допустимых форматов документов</a:t>
+            </a:r>
+          </a:p>
+          <a:p>
+            <a:pPr indent="0" algn="just"/>
+            <a:r>
+              <a:rPr lang="en-US" sz="2000" dirty="0" smtClean="0">
+                <a:solidFill>
+                  <a:schemeClr val="tx1"/>
+                </a:solidFill>
+                <a:latin typeface="Times New Roman" panose="02020603050405020304" pitchFamily="18" charset="0"/>
+                <a:cs typeface="Times New Roman" panose="02020603050405020304" pitchFamily="18" charset="0"/>
+              </a:rPr>
+              <a:t>Accept-Language</a:t>
+            </a:r>
+            <a:r>
+              <a:rPr lang="en-US" sz="2000" dirty="0">
+                <a:solidFill>
+                  <a:schemeClr val="tx1"/>
+                </a:solidFill>
+                <a:latin typeface="Times New Roman" panose="02020603050405020304" pitchFamily="18" charset="0"/>
+                <a:cs typeface="Times New Roman" panose="02020603050405020304" pitchFamily="18" charset="0"/>
+              </a:rPr>
+              <a:t>: </a:t>
+            </a:r>
+            <a:r>
+              <a:rPr lang="en-US" sz="2000" dirty="0" err="1">
+                <a:solidFill>
+                  <a:schemeClr val="tx1"/>
+                </a:solidFill>
+                <a:latin typeface="Times New Roman" panose="02020603050405020304" pitchFamily="18" charset="0"/>
+                <a:cs typeface="Times New Roman" panose="02020603050405020304" pitchFamily="18" charset="0"/>
+              </a:rPr>
+              <a:t>en</a:t>
+            </a:r>
+            <a:r>
+              <a:rPr lang="en-US" sz="2000" dirty="0">
+                <a:solidFill>
+                  <a:schemeClr val="tx1"/>
+                </a:solidFill>
+                <a:latin typeface="Times New Roman" panose="02020603050405020304" pitchFamily="18" charset="0"/>
+                <a:cs typeface="Times New Roman" panose="02020603050405020304" pitchFamily="18" charset="0"/>
+              </a:rPr>
+              <a:t>-us</a:t>
+            </a:r>
+            <a:r>
+              <a:rPr lang="en-US" sz="2000" dirty="0" smtClean="0">
+                <a:solidFill>
+                  <a:schemeClr val="tx1"/>
+                </a:solidFill>
+                <a:latin typeface="Times New Roman" panose="02020603050405020304" pitchFamily="18" charset="0"/>
+                <a:cs typeface="Times New Roman" panose="02020603050405020304" pitchFamily="18" charset="0"/>
+              </a:rPr>
+              <a:t>, </a:t>
+            </a:r>
+            <a:r>
+              <a:rPr lang="en-US" sz="2000" dirty="0" err="1" smtClean="0">
+                <a:solidFill>
+                  <a:schemeClr val="tx1"/>
+                </a:solidFill>
+                <a:latin typeface="Times New Roman" panose="02020603050405020304" pitchFamily="18" charset="0"/>
+                <a:cs typeface="Times New Roman" panose="02020603050405020304" pitchFamily="18" charset="0"/>
+              </a:rPr>
+              <a:t>en;q</a:t>
+            </a:r>
+            <a:r>
+              <a:rPr lang="en-US" sz="2000" dirty="0" smtClean="0">
+                <a:solidFill>
+                  <a:schemeClr val="tx1"/>
+                </a:solidFill>
+                <a:latin typeface="Times New Roman" panose="02020603050405020304" pitchFamily="18" charset="0"/>
+                <a:cs typeface="Times New Roman" panose="02020603050405020304" pitchFamily="18" charset="0"/>
+              </a:rPr>
+              <a:t>=0.5 </a:t>
+            </a:r>
+            <a:r>
+              <a:rPr lang="ru-RU" sz="2000" dirty="0" smtClean="0">
+                <a:solidFill>
+                  <a:schemeClr val="tx1"/>
+                </a:solidFill>
+                <a:latin typeface="Times New Roman" panose="02020603050405020304" pitchFamily="18" charset="0"/>
+                <a:cs typeface="Times New Roman" panose="02020603050405020304" pitchFamily="18" charset="0"/>
+              </a:rPr>
+              <a:t>– </a:t>
+            </a:r>
+            <a:r>
+              <a:rPr lang="ru-RU" sz="2000" i="1" dirty="0" smtClean="0">
+                <a:solidFill>
+                  <a:schemeClr val="tx1"/>
+                </a:solidFill>
+                <a:latin typeface="Times New Roman" panose="02020603050405020304" pitchFamily="18" charset="0"/>
+                <a:cs typeface="Times New Roman" panose="02020603050405020304" pitchFamily="18" charset="0"/>
+              </a:rPr>
+              <a:t>список поддерживаемых языков</a:t>
+            </a:r>
+          </a:p>
+          <a:p>
+            <a:pPr indent="0" algn="just"/>
+            <a:r>
+              <a:rPr lang="en-US" sz="2000" dirty="0" smtClean="0">
+                <a:solidFill>
+                  <a:schemeClr val="tx1"/>
+                </a:solidFill>
+                <a:latin typeface="Times New Roman" panose="02020603050405020304" pitchFamily="18" charset="0"/>
+                <a:cs typeface="Times New Roman" panose="02020603050405020304" pitchFamily="18" charset="0"/>
+              </a:rPr>
+              <a:t>Accept-Encoding</a:t>
+            </a:r>
+            <a:r>
+              <a:rPr lang="en-US" sz="2000" dirty="0">
+                <a:solidFill>
+                  <a:schemeClr val="tx1"/>
+                </a:solidFill>
+                <a:latin typeface="Times New Roman" panose="02020603050405020304" pitchFamily="18" charset="0"/>
+                <a:cs typeface="Times New Roman" panose="02020603050405020304" pitchFamily="18" charset="0"/>
+              </a:rPr>
+              <a:t>: </a:t>
+            </a:r>
+            <a:r>
+              <a:rPr lang="en-US" sz="2000" dirty="0" err="1">
+                <a:solidFill>
+                  <a:schemeClr val="tx1"/>
+                </a:solidFill>
+                <a:latin typeface="Times New Roman" panose="02020603050405020304" pitchFamily="18" charset="0"/>
+                <a:cs typeface="Times New Roman" panose="02020603050405020304" pitchFamily="18" charset="0"/>
+              </a:rPr>
+              <a:t>gzip</a:t>
+            </a:r>
+            <a:r>
+              <a:rPr lang="en-US" sz="2000" dirty="0" smtClean="0">
+                <a:solidFill>
+                  <a:schemeClr val="tx1"/>
+                </a:solidFill>
+                <a:latin typeface="Times New Roman" panose="02020603050405020304" pitchFamily="18" charset="0"/>
+                <a:cs typeface="Times New Roman" panose="02020603050405020304" pitchFamily="18" charset="0"/>
+              </a:rPr>
+              <a:t>, deflate </a:t>
+            </a:r>
+            <a:r>
+              <a:rPr lang="ru-RU" sz="2000" dirty="0" smtClean="0">
+                <a:solidFill>
+                  <a:schemeClr val="tx1"/>
+                </a:solidFill>
+                <a:latin typeface="Times New Roman" panose="02020603050405020304" pitchFamily="18" charset="0"/>
+                <a:cs typeface="Times New Roman" panose="02020603050405020304" pitchFamily="18" charset="0"/>
+              </a:rPr>
+              <a:t>– </a:t>
+            </a:r>
+            <a:r>
+              <a:rPr lang="ru-RU" sz="2000" i="1" dirty="0" smtClean="0">
+                <a:solidFill>
+                  <a:schemeClr val="tx1"/>
+                </a:solidFill>
+                <a:latin typeface="Times New Roman" panose="02020603050405020304" pitchFamily="18" charset="0"/>
+                <a:cs typeface="Times New Roman" panose="02020603050405020304" pitchFamily="18" charset="0"/>
+              </a:rPr>
+              <a:t>перечень поддерживаемых способов кодирования</a:t>
+            </a:r>
+          </a:p>
+          <a:p>
+            <a:pPr indent="0" algn="just"/>
+            <a:r>
+              <a:rPr lang="en-US" sz="2000" dirty="0" smtClean="0">
+                <a:solidFill>
+                  <a:schemeClr val="tx1"/>
+                </a:solidFill>
+                <a:latin typeface="Times New Roman" panose="02020603050405020304" pitchFamily="18" charset="0"/>
+                <a:cs typeface="Times New Roman" panose="02020603050405020304" pitchFamily="18" charset="0"/>
+              </a:rPr>
+              <a:t>Accept-Charset</a:t>
+            </a:r>
+            <a:r>
+              <a:rPr lang="en-US" sz="2000" dirty="0">
+                <a:solidFill>
+                  <a:schemeClr val="tx1"/>
+                </a:solidFill>
+                <a:latin typeface="Times New Roman" panose="02020603050405020304" pitchFamily="18" charset="0"/>
+                <a:cs typeface="Times New Roman" panose="02020603050405020304" pitchFamily="18" charset="0"/>
+              </a:rPr>
+              <a:t>: </a:t>
+            </a:r>
+            <a:r>
+              <a:rPr lang="en-US" sz="2000" dirty="0" smtClean="0">
+                <a:solidFill>
+                  <a:schemeClr val="tx1"/>
+                </a:solidFill>
+                <a:latin typeface="Times New Roman" panose="02020603050405020304" pitchFamily="18" charset="0"/>
+                <a:cs typeface="Times New Roman" panose="02020603050405020304" pitchFamily="18" charset="0"/>
+              </a:rPr>
+              <a:t>ISO-8859-1,utf-8</a:t>
+            </a:r>
+            <a:r>
+              <a:rPr lang="ru-RU" sz="2000" dirty="0" smtClean="0">
+                <a:solidFill>
+                  <a:schemeClr val="tx1"/>
+                </a:solidFill>
+                <a:latin typeface="Times New Roman" panose="02020603050405020304" pitchFamily="18" charset="0"/>
+                <a:cs typeface="Times New Roman" panose="02020603050405020304" pitchFamily="18" charset="0"/>
+              </a:rPr>
+              <a:t> – </a:t>
+            </a:r>
+            <a:r>
+              <a:rPr lang="ru-RU" sz="2000" i="1" dirty="0" smtClean="0">
+                <a:solidFill>
+                  <a:schemeClr val="tx1"/>
+                </a:solidFill>
+                <a:latin typeface="Times New Roman" panose="02020603050405020304" pitchFamily="18" charset="0"/>
+                <a:cs typeface="Times New Roman" panose="02020603050405020304" pitchFamily="18" charset="0"/>
+              </a:rPr>
+              <a:t>список поддерживаемых кодировок</a:t>
+            </a:r>
+          </a:p>
+          <a:p>
+            <a:pPr indent="0" algn="just"/>
+            <a:r>
+              <a:rPr lang="en-US" sz="2000" dirty="0" smtClean="0">
+                <a:solidFill>
+                  <a:schemeClr val="tx1"/>
+                </a:solidFill>
+                <a:latin typeface="Times New Roman" panose="02020603050405020304" pitchFamily="18" charset="0"/>
+                <a:cs typeface="Times New Roman" panose="02020603050405020304" pitchFamily="18" charset="0"/>
+              </a:rPr>
+              <a:t>Keep-Alive</a:t>
+            </a:r>
+            <a:r>
+              <a:rPr lang="en-US" sz="2000" dirty="0">
+                <a:solidFill>
+                  <a:schemeClr val="tx1"/>
+                </a:solidFill>
+                <a:latin typeface="Times New Roman" panose="02020603050405020304" pitchFamily="18" charset="0"/>
+                <a:cs typeface="Times New Roman" panose="02020603050405020304" pitchFamily="18" charset="0"/>
+              </a:rPr>
+              <a:t>: 300 </a:t>
+            </a:r>
+            <a:r>
+              <a:rPr lang="ru-RU" sz="2000" dirty="0" smtClean="0">
+                <a:solidFill>
+                  <a:schemeClr val="tx1"/>
+                </a:solidFill>
+                <a:latin typeface="Times New Roman" panose="02020603050405020304" pitchFamily="18" charset="0"/>
+                <a:cs typeface="Times New Roman" panose="02020603050405020304" pitchFamily="18" charset="0"/>
+              </a:rPr>
+              <a:t>– </a:t>
+            </a:r>
+            <a:r>
+              <a:rPr lang="ru-RU" sz="2000" i="1" dirty="0" smtClean="0">
+                <a:solidFill>
+                  <a:schemeClr val="tx1"/>
+                </a:solidFill>
+                <a:latin typeface="Times New Roman" panose="02020603050405020304" pitchFamily="18" charset="0"/>
+                <a:cs typeface="Times New Roman" panose="02020603050405020304" pitchFamily="18" charset="0"/>
+              </a:rPr>
+              <a:t>значение параметра для </a:t>
+            </a:r>
+            <a:r>
+              <a:rPr lang="en-US" sz="2000" i="1" dirty="0" smtClean="0">
+                <a:solidFill>
+                  <a:schemeClr val="tx1"/>
+                </a:solidFill>
+                <a:latin typeface="Times New Roman" panose="02020603050405020304" pitchFamily="18" charset="0"/>
+                <a:cs typeface="Times New Roman" panose="02020603050405020304" pitchFamily="18" charset="0"/>
+              </a:rPr>
+              <a:t>keep-alive</a:t>
+            </a:r>
+            <a:r>
+              <a:rPr lang="ru-RU" sz="2000" i="1" dirty="0" smtClean="0">
+                <a:solidFill>
+                  <a:schemeClr val="tx1"/>
+                </a:solidFill>
+                <a:latin typeface="Times New Roman" panose="02020603050405020304" pitchFamily="18" charset="0"/>
+                <a:cs typeface="Times New Roman" panose="02020603050405020304" pitchFamily="18" charset="0"/>
+              </a:rPr>
+              <a:t> соединения</a:t>
+            </a:r>
+          </a:p>
+          <a:p>
+            <a:pPr indent="0" algn="just"/>
+            <a:r>
+              <a:rPr lang="en-US" sz="2000" dirty="0" smtClean="0">
+                <a:solidFill>
+                  <a:schemeClr val="tx1"/>
+                </a:solidFill>
+                <a:latin typeface="Times New Roman" panose="02020603050405020304" pitchFamily="18" charset="0"/>
+                <a:cs typeface="Times New Roman" panose="02020603050405020304" pitchFamily="18" charset="0"/>
+              </a:rPr>
+              <a:t>Connection</a:t>
+            </a:r>
+            <a:r>
+              <a:rPr lang="en-US" sz="2000" dirty="0">
+                <a:solidFill>
+                  <a:schemeClr val="tx1"/>
+                </a:solidFill>
+                <a:latin typeface="Times New Roman" panose="02020603050405020304" pitchFamily="18" charset="0"/>
+                <a:cs typeface="Times New Roman" panose="02020603050405020304" pitchFamily="18" charset="0"/>
+              </a:rPr>
+              <a:t>: </a:t>
+            </a:r>
+            <a:r>
+              <a:rPr lang="en-US" sz="2000" dirty="0" smtClean="0">
+                <a:solidFill>
+                  <a:schemeClr val="tx1"/>
+                </a:solidFill>
+                <a:latin typeface="Times New Roman" panose="02020603050405020304" pitchFamily="18" charset="0"/>
+                <a:cs typeface="Times New Roman" panose="02020603050405020304" pitchFamily="18" charset="0"/>
+              </a:rPr>
+              <a:t>keep-alive – </a:t>
+            </a:r>
+            <a:r>
+              <a:rPr lang="ru-RU" sz="2000" i="1" dirty="0" smtClean="0">
+                <a:solidFill>
+                  <a:schemeClr val="tx1"/>
+                </a:solidFill>
+                <a:latin typeface="Times New Roman" panose="02020603050405020304" pitchFamily="18" charset="0"/>
+                <a:cs typeface="Times New Roman" panose="02020603050405020304" pitchFamily="18" charset="0"/>
+              </a:rPr>
+              <a:t>сведения о проведения соединения</a:t>
+            </a:r>
+          </a:p>
+        </p:txBody>
+      </p:sp>
+      <p:sp>
+        <p:nvSpPr>
+          <p:cNvPr id="6" name="TextBox 5"/>
+          <p:cNvSpPr txBox="1"/>
+          <p:nvPr/>
+        </p:nvSpPr>
+        <p:spPr>
+          <a:xfrm>
+            <a:off x="6381347" y="2870999"/>
+            <a:ext cx="2762653" cy="923330"/>
+          </a:xfrm>
+          <a:prstGeom prst="rect">
+            <a:avLst/>
+          </a:prstGeom>
+          <a:noFill/>
+        </p:spPr>
+        <p:txBody>
+          <a:bodyPr wrap="square" rtlCol="0">
+            <a:spAutoFit/>
+          </a:bodyPr>
+          <a:lstStyle/>
+          <a:p>
+            <a:pPr algn="just"/>
+            <a:r>
+              <a:rPr lang="ru-RU" i="1" dirty="0">
+                <a:latin typeface="Times New Roman" panose="02020603050405020304" pitchFamily="18" charset="0"/>
+                <a:cs typeface="Times New Roman" panose="02020603050405020304" pitchFamily="18" charset="0"/>
+              </a:rPr>
+              <a:t>т</a:t>
+            </a:r>
+            <a:r>
+              <a:rPr lang="ru-RU" i="1" dirty="0" smtClean="0">
+                <a:latin typeface="Times New Roman" panose="02020603050405020304" pitchFamily="18" charset="0"/>
+                <a:cs typeface="Times New Roman" panose="02020603050405020304" pitchFamily="18" charset="0"/>
+              </a:rPr>
+              <a:t>ип запроса, адрес документа на машине, версия протокола</a:t>
+            </a:r>
+            <a:endParaRPr lang="ru-RU" i="1" dirty="0">
+              <a:latin typeface="Times New Roman" panose="02020603050405020304" pitchFamily="18" charset="0"/>
+              <a:cs typeface="Times New Roman" panose="02020603050405020304" pitchFamily="18" charset="0"/>
+            </a:endParaRPr>
+          </a:p>
+        </p:txBody>
+      </p:sp>
+    </p:spTree>
+    <p:extLst>
+      <p:ext uri="{BB962C8B-B14F-4D97-AF65-F5344CB8AC3E}">
+        <p14:creationId xmlns:p14="http://schemas.microsoft.com/office/powerpoint/2010/main" val="123731090"/>
+      </p:ext>
+    </p:extLst>
+  </p:cSld>
+  <p:clrMapOvr>
+    <a:masterClrMapping/>
+  </p:clrMapOvr>
+  <p:timing>
+    <p:tnLst>
+      <p:par>
+        <p:cTn id="1" dur="indefinite" restart="never" nodeType="tmRoot"/>
+      </p:par>
+    </p:tnLst>
+  </p:timing>
+</p:sld>
+</file>
+
+<file path=ppt/slides/slide15.xml><?xml version="1.0" encoding="utf-8"?>
+<p:sld xmlns:a="http://schemas.openxmlformats.org/drawingml/2006/main" xmlns:r="http://schemas.openxmlformats.org/officeDocument/2006/relationships" xmlns:p="http://schemas.openxmlformats.org/presentationml/2006/main">
+  <p:cSld>
+    <p:spTree>
+      <p:nvGrpSpPr>
+        <p:cNvPr id="1" name=""/>
+        <p:cNvGrpSpPr/>
+        <p:nvPr/>
+      </p:nvGrpSpPr>
+      <p:grpSpPr>
+        <a:xfrm>
+          <a:off x="0" y="0"/>
+          <a:ext cx="0" cy="0"/>
+          <a:chOff x="0" y="0"/>
+          <a:chExt cx="0" cy="0"/>
+        </a:xfrm>
+      </p:grpSpPr>
+      <p:sp>
+        <p:nvSpPr>
+          <p:cNvPr id="3" name="Заголовок 2"/>
+          <p:cNvSpPr>
+            <a:spLocks noGrp="1"/>
+          </p:cNvSpPr>
+          <p:nvPr>
+            <p:ph type="title"/>
+          </p:nvPr>
+        </p:nvSpPr>
+        <p:spPr/>
+        <p:txBody>
+          <a:bodyPr/>
+          <a:lstStyle/>
+          <a:p>
+            <a:r>
+              <a:rPr lang="en-US" dirty="0" smtClean="0"/>
+              <a:t>HTTP-</a:t>
+            </a:r>
+            <a:r>
+              <a:rPr lang="ru-RU" dirty="0" smtClean="0"/>
+              <a:t>методы</a:t>
+            </a:r>
+            <a:endParaRPr lang="ru-RU" dirty="0"/>
+          </a:p>
+        </p:txBody>
+      </p:sp>
+      <p:sp>
+        <p:nvSpPr>
+          <p:cNvPr id="4" name="Текст 3">
+            <a:extLst>
+              <a:ext uri="{FF2B5EF4-FFF2-40B4-BE49-F238E27FC236}">
+                <a16:creationId xmlns:a16="http://schemas.microsoft.com/office/drawing/2014/main" id="{74C82C9C-F2A8-41A8-880B-73811E3EFC36}"/>
+              </a:ext>
+            </a:extLst>
+          </p:cNvPr>
+          <p:cNvSpPr>
+            <a:spLocks noGrp="1"/>
+          </p:cNvSpPr>
+          <p:nvPr>
+            <p:ph type="body" sz="quarter" idx="11"/>
+          </p:nvPr>
+        </p:nvSpPr>
+        <p:spPr>
+          <a:xfrm>
+            <a:off x="253096" y="6534445"/>
+            <a:ext cx="8602515" cy="323557"/>
+          </a:xfrm>
+        </p:spPr>
+        <p:txBody>
+          <a:bodyPr/>
+          <a:lstStyle/>
+          <a:p>
+            <a:endParaRPr lang="ru-RU" dirty="0"/>
+          </a:p>
+        </p:txBody>
+      </p:sp>
+      <p:sp>
+        <p:nvSpPr>
+          <p:cNvPr id="5" name="Текст 3">
+            <a:extLst>
+              <a:ext uri="{FF2B5EF4-FFF2-40B4-BE49-F238E27FC236}">
+                <a16:creationId xmlns:a16="http://schemas.microsoft.com/office/drawing/2014/main" id="{74C82C9C-F2A8-41A8-880B-73811E3EFC36}"/>
+              </a:ext>
+            </a:extLst>
+          </p:cNvPr>
+          <p:cNvSpPr txBox="1">
+            <a:spLocks/>
+          </p:cNvSpPr>
+          <p:nvPr/>
+        </p:nvSpPr>
+        <p:spPr bwMode="auto">
+          <a:xfrm>
+            <a:off x="253096" y="1332411"/>
+            <a:ext cx="8333555" cy="4763589"/>
+          </a:xfrm>
+          <a:prstGeom prst="rect">
+            <a:avLst/>
+          </a:prstGeom>
+          <a:noFill/>
+          <a:ln>
+            <a:noFill/>
+          </a:ln>
+          <a:extLst>
+            <a:ext uri="{909E8E84-426E-40DD-AFC4-6F175D3DCCD1}">
+              <a14:hiddenFill xmlns:a14="http://schemas.microsoft.com/office/drawing/2010/main">
+                <a:solidFill>
+                  <a:srgbClr val="FFFFFF"/>
+                </a:solidFill>
+              </a14:hiddenFill>
+            </a:ext>
+            <a:ext uri="{91240B29-F687-4F45-9708-019B960494DF}">
+              <a14:hiddenLine xmlns:a14="http://schemas.microsoft.com/office/drawing/2010/main" w="9525">
+                <a:solidFill>
+                  <a:srgbClr val="000000"/>
+                </a:solidFill>
+                <a:miter lim="800000"/>
+                <a:headEnd/>
+                <a:tailEnd/>
+              </a14:hiddenLine>
+            </a:ext>
+          </a:extLst>
+        </p:spPr>
+        <p:txBody>
+          <a:bodyPr vert="horz" wrap="square" lIns="91440" tIns="45720" rIns="91440" bIns="45720" numCol="1" anchor="t" anchorCtr="0" compatLnSpc="1">
+            <a:prstTxWarp prst="textNoShape">
+              <a:avLst/>
+            </a:prstTxWarp>
+            <a:normAutofit/>
+          </a:bodyPr>
+          <a:lstStyle>
+            <a:lvl1pPr marL="0" marR="0" indent="-342900" algn="l" defTabSz="180000" rtl="0" eaLnBrk="1" fontAlgn="auto" latinLnBrk="0" hangingPunct="1">
+              <a:lnSpc>
+                <a:spcPct val="100000"/>
+              </a:lnSpc>
+              <a:spcBef>
+                <a:spcPct val="20000"/>
+              </a:spcBef>
+              <a:spcAft>
+                <a:spcPts val="0"/>
+              </a:spcAft>
+              <a:buClrTx/>
+              <a:buSzTx/>
+              <a:buFont typeface="Arial" pitchFamily="34" charset="0"/>
+              <a:buNone/>
+              <a:tabLst/>
+              <a:defRPr sz="900" kern="1200">
+                <a:solidFill>
+                  <a:schemeClr val="tx1">
+                    <a:lumMod val="50000"/>
+                    <a:lumOff val="50000"/>
+                  </a:schemeClr>
+                </a:solidFill>
+                <a:latin typeface="Arial" pitchFamily="34" charset="0"/>
+                <a:ea typeface="+mn-ea"/>
+                <a:cs typeface="Arial" pitchFamily="34" charset="0"/>
+              </a:defRPr>
+            </a:lvl1pPr>
+            <a:lvl2pPr marL="742950" indent="-285750" algn="l" rtl="0" eaLnBrk="0" fontAlgn="base" hangingPunct="0">
+              <a:spcBef>
+                <a:spcPct val="20000"/>
+              </a:spcBef>
+              <a:spcAft>
+                <a:spcPct val="0"/>
+              </a:spcAft>
+              <a:buFont typeface="Arial" charset="0"/>
+              <a:buChar char="–"/>
+              <a:defRPr sz="2800" kern="1200">
+                <a:solidFill>
+                  <a:schemeClr val="tx1"/>
+                </a:solidFill>
+                <a:latin typeface="+mn-lt"/>
+                <a:ea typeface="+mn-ea"/>
+                <a:cs typeface="+mn-cs"/>
+              </a:defRPr>
+            </a:lvl2pPr>
+            <a:lvl3pPr marL="1143000" indent="-228600" algn="l" rtl="0" eaLnBrk="0" fontAlgn="base" hangingPunct="0">
+              <a:spcBef>
+                <a:spcPct val="20000"/>
+              </a:spcBef>
+              <a:spcAft>
+                <a:spcPct val="0"/>
+              </a:spcAft>
+              <a:buFont typeface="Arial" charset="0"/>
+              <a:buChar char="•"/>
+              <a:defRPr sz="2400" kern="1200">
+                <a:solidFill>
+                  <a:schemeClr val="tx1"/>
+                </a:solidFill>
+                <a:latin typeface="+mn-lt"/>
+                <a:ea typeface="+mn-ea"/>
+                <a:cs typeface="+mn-cs"/>
+              </a:defRPr>
+            </a:lvl3pPr>
+            <a:lvl4pPr marL="1600200" indent="-228600" algn="l" rtl="0" eaLnBrk="0" fontAlgn="base" hangingPunct="0">
+              <a:spcBef>
+                <a:spcPct val="20000"/>
+              </a:spcBef>
+              <a:spcAft>
+                <a:spcPct val="0"/>
+              </a:spcAft>
+              <a:buFont typeface="Arial" charset="0"/>
+              <a:buChar char="–"/>
+              <a:defRPr sz="2000" kern="1200">
+                <a:solidFill>
+                  <a:schemeClr val="tx1"/>
+                </a:solidFill>
+                <a:latin typeface="+mn-lt"/>
+                <a:ea typeface="+mn-ea"/>
+                <a:cs typeface="+mn-cs"/>
+              </a:defRPr>
+            </a:lvl4pPr>
+            <a:lvl5pPr marL="2057400" indent="-228600" algn="l" rtl="0" eaLnBrk="0" fontAlgn="base" hangingPunct="0">
+              <a:spcBef>
+                <a:spcPct val="20000"/>
+              </a:spcBef>
+              <a:spcAft>
+                <a:spcPct val="0"/>
+              </a:spcAft>
+              <a:buFont typeface="Arial" charset="0"/>
+              <a:buChar char="»"/>
+              <a:defRPr sz="2000" kern="1200">
+                <a:solidFill>
+                  <a:schemeClr val="tx1"/>
+                </a:solidFill>
+                <a:latin typeface="+mn-lt"/>
+                <a:ea typeface="+mn-ea"/>
+                <a:cs typeface="+mn-cs"/>
+              </a:defRPr>
+            </a:lvl5pPr>
+            <a:lvl6pPr marL="2514600" indent="-228600" algn="l" defTabSz="914400" rtl="0" eaLnBrk="1" latinLnBrk="0" hangingPunct="1">
+              <a:spcBef>
+                <a:spcPct val="20000"/>
+              </a:spcBef>
+              <a:buFont typeface="Arial" pitchFamily="34" charset="0"/>
+              <a:buChar char="•"/>
+              <a:defRPr sz="2000" kern="1200">
+                <a:solidFill>
+                  <a:schemeClr val="tx1"/>
+                </a:solidFill>
+                <a:latin typeface="+mn-lt"/>
+                <a:ea typeface="+mn-ea"/>
+                <a:cs typeface="+mn-cs"/>
+              </a:defRPr>
+            </a:lvl6pPr>
+            <a:lvl7pPr marL="2971800" indent="-228600" algn="l" defTabSz="914400" rtl="0" eaLnBrk="1" latinLnBrk="0" hangingPunct="1">
+              <a:spcBef>
+                <a:spcPct val="20000"/>
+              </a:spcBef>
+              <a:buFont typeface="Arial" pitchFamily="34" charset="0"/>
+              <a:buChar char="•"/>
+              <a:defRPr sz="2000" kern="1200">
+                <a:solidFill>
+                  <a:schemeClr val="tx1"/>
+                </a:solidFill>
+                <a:latin typeface="+mn-lt"/>
+                <a:ea typeface="+mn-ea"/>
+                <a:cs typeface="+mn-cs"/>
+              </a:defRPr>
+            </a:lvl7pPr>
+            <a:lvl8pPr marL="3429000" indent="-228600" algn="l" defTabSz="914400" rtl="0" eaLnBrk="1" latinLnBrk="0" hangingPunct="1">
+              <a:spcBef>
+                <a:spcPct val="20000"/>
+              </a:spcBef>
+              <a:buFont typeface="Arial" pitchFamily="34" charset="0"/>
+              <a:buChar char="•"/>
+              <a:defRPr sz="2000" kern="1200">
+                <a:solidFill>
+                  <a:schemeClr val="tx1"/>
+                </a:solidFill>
+                <a:latin typeface="+mn-lt"/>
+                <a:ea typeface="+mn-ea"/>
+                <a:cs typeface="+mn-cs"/>
+              </a:defRPr>
+            </a:lvl8pPr>
+            <a:lvl9pPr marL="3886200" indent="-228600" algn="l" defTabSz="914400" rtl="0" eaLnBrk="1" latinLnBrk="0" hangingPunct="1">
+              <a:spcBef>
+                <a:spcPct val="20000"/>
+              </a:spcBef>
+              <a:buFont typeface="Arial" pitchFamily="34" charset="0"/>
+              <a:buChar char="•"/>
+              <a:defRPr sz="2000" kern="1200">
+                <a:solidFill>
+                  <a:schemeClr val="tx1"/>
+                </a:solidFill>
+                <a:latin typeface="+mn-lt"/>
+                <a:ea typeface="+mn-ea"/>
+                <a:cs typeface="+mn-cs"/>
+              </a:defRPr>
+            </a:lvl9pPr>
+          </a:lstStyle>
+          <a:p>
+            <a:pPr indent="0" algn="just"/>
+            <a:r>
+              <a:rPr lang="ru-RU" sz="2000" dirty="0" smtClean="0">
+                <a:solidFill>
+                  <a:schemeClr val="tx1"/>
+                </a:solidFill>
+                <a:latin typeface="Times New Roman" panose="02020603050405020304" pitchFamily="18" charset="0"/>
+                <a:cs typeface="Times New Roman" panose="02020603050405020304" pitchFamily="18" charset="0"/>
+              </a:rPr>
+              <a:t>Метод – способ взаимодействия клиента и сервера</a:t>
+            </a:r>
+          </a:p>
+          <a:p>
+            <a:pPr indent="0" algn="just"/>
+            <a:endParaRPr lang="ru-RU" sz="2000" dirty="0">
+              <a:solidFill>
+                <a:schemeClr val="tx1"/>
+              </a:solidFill>
+              <a:latin typeface="Times New Roman" panose="02020603050405020304" pitchFamily="18" charset="0"/>
+              <a:cs typeface="Times New Roman" panose="02020603050405020304" pitchFamily="18" charset="0"/>
+            </a:endParaRPr>
+          </a:p>
+          <a:p>
+            <a:pPr>
+              <a:buFont typeface="Arial" panose="020B0604020202020204" pitchFamily="34" charset="0"/>
+              <a:buChar char="•"/>
+            </a:pPr>
+            <a:r>
+              <a:rPr lang="en-US" sz="2000" b="1" dirty="0" smtClean="0">
+                <a:solidFill>
+                  <a:schemeClr val="tx1"/>
+                </a:solidFill>
+                <a:latin typeface="Times New Roman" panose="02020603050405020304" pitchFamily="18" charset="0"/>
+                <a:cs typeface="Times New Roman" panose="02020603050405020304" pitchFamily="18" charset="0"/>
+              </a:rPr>
+              <a:t>GET </a:t>
+            </a:r>
+            <a:r>
+              <a:rPr lang="en-US" sz="2000" dirty="0">
+                <a:solidFill>
+                  <a:schemeClr val="tx1"/>
+                </a:solidFill>
+                <a:latin typeface="Times New Roman" panose="02020603050405020304" pitchFamily="18" charset="0"/>
+                <a:cs typeface="Times New Roman" panose="02020603050405020304" pitchFamily="18" charset="0"/>
+              </a:rPr>
+              <a:t>- </a:t>
+            </a:r>
+            <a:r>
+              <a:rPr lang="ru-RU" sz="2000" dirty="0">
+                <a:solidFill>
+                  <a:schemeClr val="tx1"/>
+                </a:solidFill>
+                <a:latin typeface="Times New Roman" panose="02020603050405020304" pitchFamily="18" charset="0"/>
+                <a:cs typeface="Times New Roman" panose="02020603050405020304" pitchFamily="18" charset="0"/>
+              </a:rPr>
+              <a:t>получение </a:t>
+            </a:r>
+            <a:r>
+              <a:rPr lang="ru-RU" sz="2000" dirty="0" smtClean="0">
+                <a:solidFill>
+                  <a:schemeClr val="tx1"/>
+                </a:solidFill>
+                <a:latin typeface="Times New Roman" panose="02020603050405020304" pitchFamily="18" charset="0"/>
+                <a:cs typeface="Times New Roman" panose="02020603050405020304" pitchFamily="18" charset="0"/>
+              </a:rPr>
+              <a:t>документа (клиент просит сервер вернуть документ)</a:t>
+            </a:r>
+          </a:p>
+          <a:p>
+            <a:pPr>
+              <a:buFont typeface="Arial" panose="020B0604020202020204" pitchFamily="34" charset="0"/>
+              <a:buChar char="•"/>
+            </a:pPr>
+            <a:r>
+              <a:rPr lang="ru-RU" sz="2000" b="1" dirty="0" smtClean="0">
+                <a:solidFill>
+                  <a:schemeClr val="tx1"/>
+                </a:solidFill>
+                <a:latin typeface="Times New Roman" panose="02020603050405020304" pitchFamily="18" charset="0"/>
+                <a:cs typeface="Times New Roman" panose="02020603050405020304" pitchFamily="18" charset="0"/>
+              </a:rPr>
+              <a:t>POST </a:t>
+            </a:r>
+            <a:r>
+              <a:rPr lang="ru-RU" sz="2000" dirty="0">
+                <a:solidFill>
+                  <a:schemeClr val="tx1"/>
+                </a:solidFill>
+                <a:latin typeface="Times New Roman" panose="02020603050405020304" pitchFamily="18" charset="0"/>
+                <a:cs typeface="Times New Roman" panose="02020603050405020304" pitchFamily="18" charset="0"/>
+              </a:rPr>
+              <a:t>- отправка данных на </a:t>
+            </a:r>
+            <a:r>
+              <a:rPr lang="ru-RU" sz="2000" dirty="0" smtClean="0">
+                <a:solidFill>
+                  <a:schemeClr val="tx1"/>
+                </a:solidFill>
+                <a:latin typeface="Times New Roman" panose="02020603050405020304" pitchFamily="18" charset="0"/>
+                <a:cs typeface="Times New Roman" panose="02020603050405020304" pitchFamily="18" charset="0"/>
+              </a:rPr>
+              <a:t>сервер (отправка произвольных данных на сервер)</a:t>
+            </a:r>
+          </a:p>
+          <a:p>
+            <a:pPr>
+              <a:buFont typeface="Arial" panose="020B0604020202020204" pitchFamily="34" charset="0"/>
+              <a:buChar char="•"/>
+            </a:pPr>
+            <a:r>
+              <a:rPr lang="en-US" sz="2000" dirty="0">
+                <a:solidFill>
+                  <a:schemeClr val="tx1"/>
+                </a:solidFill>
+                <a:latin typeface="Times New Roman" panose="02020603050405020304" pitchFamily="18" charset="0"/>
+                <a:cs typeface="Times New Roman" panose="02020603050405020304" pitchFamily="18" charset="0"/>
+              </a:rPr>
+              <a:t>HEAD</a:t>
+            </a:r>
+            <a:r>
+              <a:rPr lang="en-US" sz="2000" b="1" dirty="0">
+                <a:solidFill>
+                  <a:schemeClr val="tx1"/>
+                </a:solidFill>
+                <a:latin typeface="Times New Roman" panose="02020603050405020304" pitchFamily="18" charset="0"/>
+                <a:cs typeface="Times New Roman" panose="02020603050405020304" pitchFamily="18" charset="0"/>
+              </a:rPr>
+              <a:t> </a:t>
+            </a:r>
+            <a:r>
+              <a:rPr lang="en-US" sz="2000" dirty="0">
+                <a:solidFill>
+                  <a:schemeClr val="tx1"/>
+                </a:solidFill>
+                <a:latin typeface="Times New Roman" panose="02020603050405020304" pitchFamily="18" charset="0"/>
+                <a:cs typeface="Times New Roman" panose="02020603050405020304" pitchFamily="18" charset="0"/>
+              </a:rPr>
+              <a:t>- </a:t>
+            </a:r>
+            <a:r>
+              <a:rPr lang="ru-RU" sz="2000" dirty="0">
+                <a:solidFill>
+                  <a:schemeClr val="tx1"/>
+                </a:solidFill>
+                <a:latin typeface="Times New Roman" panose="02020603050405020304" pitchFamily="18" charset="0"/>
+                <a:cs typeface="Times New Roman" panose="02020603050405020304" pitchFamily="18" charset="0"/>
+              </a:rPr>
+              <a:t>получение только </a:t>
+            </a:r>
+            <a:r>
+              <a:rPr lang="ru-RU" sz="2000" dirty="0" smtClean="0">
+                <a:solidFill>
+                  <a:schemeClr val="tx1"/>
+                </a:solidFill>
+                <a:latin typeface="Times New Roman" panose="02020603050405020304" pitchFamily="18" charset="0"/>
+                <a:cs typeface="Times New Roman" panose="02020603050405020304" pitchFamily="18" charset="0"/>
+              </a:rPr>
+              <a:t>заголовков (функционирует как </a:t>
+            </a:r>
+            <a:r>
+              <a:rPr lang="en-US" sz="2000" dirty="0" smtClean="0">
+                <a:solidFill>
+                  <a:schemeClr val="tx1"/>
+                </a:solidFill>
+                <a:latin typeface="Times New Roman" panose="02020603050405020304" pitchFamily="18" charset="0"/>
+                <a:cs typeface="Times New Roman" panose="02020603050405020304" pitchFamily="18" charset="0"/>
+              </a:rPr>
+              <a:t>GET</a:t>
+            </a:r>
+            <a:r>
+              <a:rPr lang="ru-RU" sz="2000" dirty="0" smtClean="0">
+                <a:solidFill>
+                  <a:schemeClr val="tx1"/>
+                </a:solidFill>
+                <a:latin typeface="Times New Roman" panose="02020603050405020304" pitchFamily="18" charset="0"/>
+                <a:cs typeface="Times New Roman" panose="02020603050405020304" pitchFamily="18" charset="0"/>
+              </a:rPr>
+              <a:t>, но просит только заголовок без документа)</a:t>
+            </a:r>
+          </a:p>
+          <a:p>
+            <a:pPr>
+              <a:buFont typeface="Arial" panose="020B0604020202020204" pitchFamily="34" charset="0"/>
+              <a:buChar char="•"/>
+            </a:pPr>
+            <a:r>
+              <a:rPr lang="ru-RU" sz="2000" dirty="0" smtClean="0">
+                <a:solidFill>
+                  <a:schemeClr val="tx1"/>
+                </a:solidFill>
+                <a:latin typeface="Times New Roman" panose="02020603050405020304" pitchFamily="18" charset="0"/>
+                <a:cs typeface="Times New Roman" panose="02020603050405020304" pitchFamily="18" charset="0"/>
+              </a:rPr>
+              <a:t>PUT </a:t>
+            </a:r>
+            <a:r>
+              <a:rPr lang="ru-RU" sz="2000" dirty="0">
+                <a:solidFill>
+                  <a:schemeClr val="tx1"/>
+                </a:solidFill>
+                <a:latin typeface="Times New Roman" panose="02020603050405020304" pitchFamily="18" charset="0"/>
+                <a:cs typeface="Times New Roman" panose="02020603050405020304" pitchFamily="18" charset="0"/>
+              </a:rPr>
+              <a:t>- отправка документа на сервер </a:t>
+            </a:r>
+            <a:r>
+              <a:rPr lang="ru-RU" sz="2000" dirty="0" smtClean="0">
+                <a:solidFill>
+                  <a:schemeClr val="tx1"/>
+                </a:solidFill>
+                <a:latin typeface="Times New Roman" panose="02020603050405020304" pitchFamily="18" charset="0"/>
+                <a:cs typeface="Times New Roman" panose="02020603050405020304" pitchFamily="18" charset="0"/>
+              </a:rPr>
+              <a:t>(но отправка документа целиком: разместить передаваемый документ по адресу)</a:t>
+            </a:r>
+          </a:p>
+          <a:p>
+            <a:pPr>
+              <a:buFont typeface="Arial" panose="020B0604020202020204" pitchFamily="34" charset="0"/>
+              <a:buChar char="•"/>
+            </a:pPr>
+            <a:r>
+              <a:rPr lang="en-US" sz="2000" dirty="0" smtClean="0">
+                <a:solidFill>
+                  <a:schemeClr val="tx1"/>
+                </a:solidFill>
+                <a:latin typeface="Times New Roman" panose="02020603050405020304" pitchFamily="18" charset="0"/>
+                <a:cs typeface="Times New Roman" panose="02020603050405020304" pitchFamily="18" charset="0"/>
+              </a:rPr>
+              <a:t>DELETE </a:t>
+            </a:r>
+            <a:r>
+              <a:rPr lang="en-US" sz="2000" dirty="0">
+                <a:solidFill>
+                  <a:schemeClr val="tx1"/>
+                </a:solidFill>
+                <a:latin typeface="Times New Roman" panose="02020603050405020304" pitchFamily="18" charset="0"/>
+                <a:cs typeface="Times New Roman" panose="02020603050405020304" pitchFamily="18" charset="0"/>
+              </a:rPr>
+              <a:t>- </a:t>
+            </a:r>
+            <a:r>
+              <a:rPr lang="ru-RU" sz="2000" dirty="0">
+                <a:solidFill>
+                  <a:schemeClr val="tx1"/>
+                </a:solidFill>
+                <a:latin typeface="Times New Roman" panose="02020603050405020304" pitchFamily="18" charset="0"/>
+                <a:cs typeface="Times New Roman" panose="02020603050405020304" pitchFamily="18" charset="0"/>
+              </a:rPr>
+              <a:t>удаление </a:t>
+            </a:r>
+            <a:r>
+              <a:rPr lang="ru-RU" sz="2000" dirty="0" smtClean="0">
+                <a:solidFill>
+                  <a:schemeClr val="tx1"/>
+                </a:solidFill>
+                <a:latin typeface="Times New Roman" panose="02020603050405020304" pitchFamily="18" charset="0"/>
+                <a:cs typeface="Times New Roman" panose="02020603050405020304" pitchFamily="18" charset="0"/>
+              </a:rPr>
+              <a:t>документа</a:t>
+            </a:r>
+          </a:p>
+          <a:p>
+            <a:pPr>
+              <a:buFont typeface="Arial" panose="020B0604020202020204" pitchFamily="34" charset="0"/>
+              <a:buChar char="•"/>
+            </a:pPr>
+            <a:r>
+              <a:rPr lang="en-US" sz="2000" dirty="0" smtClean="0">
+                <a:solidFill>
+                  <a:schemeClr val="tx1"/>
+                </a:solidFill>
+                <a:latin typeface="Times New Roman" panose="02020603050405020304" pitchFamily="18" charset="0"/>
+                <a:cs typeface="Times New Roman" panose="02020603050405020304" pitchFamily="18" charset="0"/>
+              </a:rPr>
+              <a:t>CONNECT</a:t>
+            </a:r>
+            <a:r>
+              <a:rPr lang="en-US" sz="2000" dirty="0">
+                <a:solidFill>
+                  <a:schemeClr val="tx1"/>
+                </a:solidFill>
+                <a:latin typeface="Times New Roman" panose="02020603050405020304" pitchFamily="18" charset="0"/>
+                <a:cs typeface="Times New Roman" panose="02020603050405020304" pitchFamily="18" charset="0"/>
+              </a:rPr>
+              <a:t>, TRACE, OPTIONS - </a:t>
+            </a:r>
+            <a:r>
+              <a:rPr lang="ru-RU" sz="2000" dirty="0">
+                <a:solidFill>
+                  <a:schemeClr val="tx1"/>
+                </a:solidFill>
+                <a:latin typeface="Times New Roman" panose="02020603050405020304" pitchFamily="18" charset="0"/>
+                <a:cs typeface="Times New Roman" panose="02020603050405020304" pitchFamily="18" charset="0"/>
+              </a:rPr>
+              <a:t>используются </a:t>
+            </a:r>
+            <a:r>
+              <a:rPr lang="ru-RU" sz="2000" dirty="0" smtClean="0">
+                <a:solidFill>
+                  <a:schemeClr val="tx1"/>
+                </a:solidFill>
+                <a:latin typeface="Times New Roman" panose="02020603050405020304" pitchFamily="18" charset="0"/>
+                <a:cs typeface="Times New Roman" panose="02020603050405020304" pitchFamily="18" charset="0"/>
+              </a:rPr>
+              <a:t>редко (для </a:t>
+            </a:r>
+            <a:r>
+              <a:rPr lang="ru-RU" sz="2000" dirty="0" err="1" smtClean="0">
+                <a:solidFill>
+                  <a:schemeClr val="tx1"/>
+                </a:solidFill>
+                <a:latin typeface="Times New Roman" panose="02020603050405020304" pitchFamily="18" charset="0"/>
+                <a:cs typeface="Times New Roman" panose="02020603050405020304" pitchFamily="18" charset="0"/>
+              </a:rPr>
+              <a:t>проксирования</a:t>
+            </a:r>
+            <a:r>
+              <a:rPr lang="ru-RU" sz="2000" dirty="0" smtClean="0">
+                <a:solidFill>
+                  <a:schemeClr val="tx1"/>
+                </a:solidFill>
+                <a:latin typeface="Times New Roman" panose="02020603050405020304" pitchFamily="18" charset="0"/>
+                <a:cs typeface="Times New Roman" panose="02020603050405020304" pitchFamily="18" charset="0"/>
+              </a:rPr>
+              <a:t> или получения информации о веб-сервере)</a:t>
+            </a:r>
+          </a:p>
+        </p:txBody>
+      </p:sp>
+    </p:spTree>
+    <p:extLst>
+      <p:ext uri="{BB962C8B-B14F-4D97-AF65-F5344CB8AC3E}">
+        <p14:creationId xmlns:p14="http://schemas.microsoft.com/office/powerpoint/2010/main" val="3560862345"/>
+      </p:ext>
+    </p:extLst>
+  </p:cSld>
+  <p:clrMapOvr>
+    <a:masterClrMapping/>
+  </p:clrMapOvr>
+  <p:timing>
+    <p:tnLst>
+      <p:par>
+        <p:cTn id="1" dur="indefinite" restart="never" nodeType="tmRoot"/>
+      </p:par>
+    </p:tnLst>
+  </p:timing>
+</p:sld>
+</file>
+
+<file path=ppt/slides/slide16.xml><?xml version="1.0" encoding="utf-8"?>
+<p:sld xmlns:a="http://schemas.openxmlformats.org/drawingml/2006/main" xmlns:r="http://schemas.openxmlformats.org/officeDocument/2006/relationships" xmlns:p="http://schemas.openxmlformats.org/presentationml/2006/main">
+  <p:cSld>
+    <p:spTree>
+      <p:nvGrpSpPr>
+        <p:cNvPr id="1" name=""/>
+        <p:cNvGrpSpPr/>
+        <p:nvPr/>
+      </p:nvGrpSpPr>
+      <p:grpSpPr>
+        <a:xfrm>
+          <a:off x="0" y="0"/>
+          <a:ext cx="0" cy="0"/>
+          <a:chOff x="0" y="0"/>
+          <a:chExt cx="0" cy="0"/>
+        </a:xfrm>
+      </p:grpSpPr>
+      <p:sp>
+        <p:nvSpPr>
+          <p:cNvPr id="3" name="Заголовок 2"/>
+          <p:cNvSpPr>
+            <a:spLocks noGrp="1"/>
+          </p:cNvSpPr>
+          <p:nvPr>
+            <p:ph type="title"/>
+          </p:nvPr>
+        </p:nvSpPr>
+        <p:spPr/>
+        <p:txBody>
+          <a:bodyPr/>
+          <a:lstStyle/>
+          <a:p>
+            <a:r>
+              <a:rPr lang="ru-RU" dirty="0" smtClean="0"/>
+              <a:t>Так как </a:t>
+            </a:r>
+            <a:r>
+              <a:rPr lang="ru-RU" dirty="0" smtClean="0"/>
+              <a:t>же </a:t>
+            </a:r>
+            <a:r>
+              <a:rPr lang="ru-RU" dirty="0" smtClean="0"/>
+              <a:t>будет работать наш веб-сервис?</a:t>
+            </a:r>
+            <a:endParaRPr lang="ru-RU" dirty="0"/>
+          </a:p>
+        </p:txBody>
+      </p:sp>
+      <p:sp>
+        <p:nvSpPr>
+          <p:cNvPr id="4" name="Текст 3">
+            <a:extLst>
+              <a:ext uri="{FF2B5EF4-FFF2-40B4-BE49-F238E27FC236}">
+                <a16:creationId xmlns:a16="http://schemas.microsoft.com/office/drawing/2014/main" id="{74C82C9C-F2A8-41A8-880B-73811E3EFC36}"/>
+              </a:ext>
+            </a:extLst>
+          </p:cNvPr>
+          <p:cNvSpPr>
+            <a:spLocks noGrp="1"/>
+          </p:cNvSpPr>
+          <p:nvPr>
+            <p:ph type="body" sz="quarter" idx="11"/>
+          </p:nvPr>
+        </p:nvSpPr>
+        <p:spPr>
+          <a:xfrm>
+            <a:off x="253096" y="6534445"/>
+            <a:ext cx="8602515" cy="323557"/>
+          </a:xfrm>
+        </p:spPr>
+        <p:txBody>
+          <a:bodyPr/>
+          <a:lstStyle/>
+          <a:p>
+            <a:endParaRPr lang="ru-RU" dirty="0"/>
+          </a:p>
+        </p:txBody>
+      </p:sp>
+      <p:sp>
+        <p:nvSpPr>
+          <p:cNvPr id="5" name="Текст 3">
+            <a:extLst>
+              <a:ext uri="{FF2B5EF4-FFF2-40B4-BE49-F238E27FC236}">
+                <a16:creationId xmlns:a16="http://schemas.microsoft.com/office/drawing/2014/main" id="{74C82C9C-F2A8-41A8-880B-73811E3EFC36}"/>
+              </a:ext>
+            </a:extLst>
+          </p:cNvPr>
+          <p:cNvSpPr txBox="1">
+            <a:spLocks/>
+          </p:cNvSpPr>
+          <p:nvPr/>
+        </p:nvSpPr>
+        <p:spPr bwMode="auto">
+          <a:xfrm>
+            <a:off x="253096" y="1332411"/>
+            <a:ext cx="8768984" cy="4763589"/>
+          </a:xfrm>
+          <a:prstGeom prst="rect">
+            <a:avLst/>
+          </a:prstGeom>
+          <a:noFill/>
+          <a:ln>
+            <a:noFill/>
+          </a:ln>
+          <a:extLst>
+            <a:ext uri="{909E8E84-426E-40DD-AFC4-6F175D3DCCD1}">
+              <a14:hiddenFill xmlns:a14="http://schemas.microsoft.com/office/drawing/2010/main">
+                <a:solidFill>
+                  <a:srgbClr val="FFFFFF"/>
+                </a:solidFill>
+              </a14:hiddenFill>
+            </a:ext>
+            <a:ext uri="{91240B29-F687-4F45-9708-019B960494DF}">
+              <a14:hiddenLine xmlns:a14="http://schemas.microsoft.com/office/drawing/2010/main" w="9525">
+                <a:solidFill>
+                  <a:srgbClr val="000000"/>
+                </a:solidFill>
+                <a:miter lim="800000"/>
+                <a:headEnd/>
+                <a:tailEnd/>
+              </a14:hiddenLine>
+            </a:ext>
+          </a:extLst>
+        </p:spPr>
+        <p:txBody>
+          <a:bodyPr vert="horz" wrap="square" lIns="91440" tIns="45720" rIns="91440" bIns="45720" numCol="1" anchor="t" anchorCtr="0" compatLnSpc="1">
+            <a:prstTxWarp prst="textNoShape">
+              <a:avLst/>
+            </a:prstTxWarp>
+            <a:normAutofit/>
+          </a:bodyPr>
+          <a:lstStyle>
+            <a:lvl1pPr marL="0" marR="0" indent="-342900" algn="l" defTabSz="180000" rtl="0" eaLnBrk="1" fontAlgn="auto" latinLnBrk="0" hangingPunct="1">
+              <a:lnSpc>
+                <a:spcPct val="100000"/>
+              </a:lnSpc>
+              <a:spcBef>
+                <a:spcPct val="20000"/>
+              </a:spcBef>
+              <a:spcAft>
+                <a:spcPts val="0"/>
+              </a:spcAft>
+              <a:buClrTx/>
+              <a:buSzTx/>
+              <a:buFont typeface="Arial" pitchFamily="34" charset="0"/>
+              <a:buNone/>
+              <a:tabLst/>
+              <a:defRPr sz="900" kern="1200">
+                <a:solidFill>
+                  <a:schemeClr val="tx1">
+                    <a:lumMod val="50000"/>
+                    <a:lumOff val="50000"/>
+                  </a:schemeClr>
+                </a:solidFill>
+                <a:latin typeface="Arial" pitchFamily="34" charset="0"/>
+                <a:ea typeface="+mn-ea"/>
+                <a:cs typeface="Arial" pitchFamily="34" charset="0"/>
+              </a:defRPr>
+            </a:lvl1pPr>
+            <a:lvl2pPr marL="742950" indent="-285750" algn="l" rtl="0" eaLnBrk="0" fontAlgn="base" hangingPunct="0">
+              <a:spcBef>
+                <a:spcPct val="20000"/>
+              </a:spcBef>
+              <a:spcAft>
+                <a:spcPct val="0"/>
+              </a:spcAft>
+              <a:buFont typeface="Arial" charset="0"/>
+              <a:buChar char="–"/>
+              <a:defRPr sz="2800" kern="1200">
+                <a:solidFill>
+                  <a:schemeClr val="tx1"/>
+                </a:solidFill>
+                <a:latin typeface="+mn-lt"/>
+                <a:ea typeface="+mn-ea"/>
+                <a:cs typeface="+mn-cs"/>
+              </a:defRPr>
+            </a:lvl2pPr>
+            <a:lvl3pPr marL="1143000" indent="-228600" algn="l" rtl="0" eaLnBrk="0" fontAlgn="base" hangingPunct="0">
+              <a:spcBef>
+                <a:spcPct val="20000"/>
+              </a:spcBef>
+              <a:spcAft>
+                <a:spcPct val="0"/>
+              </a:spcAft>
+              <a:buFont typeface="Arial" charset="0"/>
+              <a:buChar char="•"/>
+              <a:defRPr sz="2400" kern="1200">
+                <a:solidFill>
+                  <a:schemeClr val="tx1"/>
+                </a:solidFill>
+                <a:latin typeface="+mn-lt"/>
+                <a:ea typeface="+mn-ea"/>
+                <a:cs typeface="+mn-cs"/>
+              </a:defRPr>
+            </a:lvl3pPr>
+            <a:lvl4pPr marL="1600200" indent="-228600" algn="l" rtl="0" eaLnBrk="0" fontAlgn="base" hangingPunct="0">
+              <a:spcBef>
+                <a:spcPct val="20000"/>
+              </a:spcBef>
+              <a:spcAft>
+                <a:spcPct val="0"/>
+              </a:spcAft>
+              <a:buFont typeface="Arial" charset="0"/>
+              <a:buChar char="–"/>
+              <a:defRPr sz="2000" kern="1200">
+                <a:solidFill>
+                  <a:schemeClr val="tx1"/>
+                </a:solidFill>
+                <a:latin typeface="+mn-lt"/>
+                <a:ea typeface="+mn-ea"/>
+                <a:cs typeface="+mn-cs"/>
+              </a:defRPr>
+            </a:lvl4pPr>
+            <a:lvl5pPr marL="2057400" indent="-228600" algn="l" rtl="0" eaLnBrk="0" fontAlgn="base" hangingPunct="0">
+              <a:spcBef>
+                <a:spcPct val="20000"/>
+              </a:spcBef>
+              <a:spcAft>
+                <a:spcPct val="0"/>
+              </a:spcAft>
+              <a:buFont typeface="Arial" charset="0"/>
+              <a:buChar char="»"/>
+              <a:defRPr sz="2000" kern="1200">
+                <a:solidFill>
+                  <a:schemeClr val="tx1"/>
+                </a:solidFill>
+                <a:latin typeface="+mn-lt"/>
+                <a:ea typeface="+mn-ea"/>
+                <a:cs typeface="+mn-cs"/>
+              </a:defRPr>
+            </a:lvl5pPr>
+            <a:lvl6pPr marL="2514600" indent="-228600" algn="l" defTabSz="914400" rtl="0" eaLnBrk="1" latinLnBrk="0" hangingPunct="1">
+              <a:spcBef>
+                <a:spcPct val="20000"/>
+              </a:spcBef>
+              <a:buFont typeface="Arial" pitchFamily="34" charset="0"/>
+              <a:buChar char="•"/>
+              <a:defRPr sz="2000" kern="1200">
+                <a:solidFill>
+                  <a:schemeClr val="tx1"/>
+                </a:solidFill>
+                <a:latin typeface="+mn-lt"/>
+                <a:ea typeface="+mn-ea"/>
+                <a:cs typeface="+mn-cs"/>
+              </a:defRPr>
+            </a:lvl6pPr>
+            <a:lvl7pPr marL="2971800" indent="-228600" algn="l" defTabSz="914400" rtl="0" eaLnBrk="1" latinLnBrk="0" hangingPunct="1">
+              <a:spcBef>
+                <a:spcPct val="20000"/>
+              </a:spcBef>
+              <a:buFont typeface="Arial" pitchFamily="34" charset="0"/>
+              <a:buChar char="•"/>
+              <a:defRPr sz="2000" kern="1200">
+                <a:solidFill>
+                  <a:schemeClr val="tx1"/>
+                </a:solidFill>
+                <a:latin typeface="+mn-lt"/>
+                <a:ea typeface="+mn-ea"/>
+                <a:cs typeface="+mn-cs"/>
+              </a:defRPr>
+            </a:lvl7pPr>
+            <a:lvl8pPr marL="3429000" indent="-228600" algn="l" defTabSz="914400" rtl="0" eaLnBrk="1" latinLnBrk="0" hangingPunct="1">
+              <a:spcBef>
+                <a:spcPct val="20000"/>
+              </a:spcBef>
+              <a:buFont typeface="Arial" pitchFamily="34" charset="0"/>
+              <a:buChar char="•"/>
+              <a:defRPr sz="2000" kern="1200">
+                <a:solidFill>
+                  <a:schemeClr val="tx1"/>
+                </a:solidFill>
+                <a:latin typeface="+mn-lt"/>
+                <a:ea typeface="+mn-ea"/>
+                <a:cs typeface="+mn-cs"/>
+              </a:defRPr>
+            </a:lvl8pPr>
+            <a:lvl9pPr marL="3886200" indent="-228600" algn="l" defTabSz="914400" rtl="0" eaLnBrk="1" latinLnBrk="0" hangingPunct="1">
+              <a:spcBef>
+                <a:spcPct val="20000"/>
+              </a:spcBef>
+              <a:buFont typeface="Arial" pitchFamily="34" charset="0"/>
+              <a:buChar char="•"/>
+              <a:defRPr sz="2000" kern="1200">
+                <a:solidFill>
+                  <a:schemeClr val="tx1"/>
+                </a:solidFill>
+                <a:latin typeface="+mn-lt"/>
+                <a:ea typeface="+mn-ea"/>
+                <a:cs typeface="+mn-cs"/>
+              </a:defRPr>
+            </a:lvl9pPr>
+          </a:lstStyle>
+          <a:p>
+            <a:pPr indent="0" algn="just"/>
+            <a:r>
+              <a:rPr lang="en-US" sz="2000" dirty="0">
+                <a:solidFill>
+                  <a:schemeClr val="tx1"/>
+                </a:solidFill>
+                <a:latin typeface="Times New Roman" panose="02020603050405020304" pitchFamily="18" charset="0"/>
+                <a:cs typeface="Times New Roman" panose="02020603050405020304" pitchFamily="18" charset="0"/>
+              </a:rPr>
+              <a:t>Web</a:t>
+            </a:r>
+            <a:r>
+              <a:rPr lang="ru-RU" sz="2000" dirty="0">
+                <a:solidFill>
+                  <a:schemeClr val="tx1"/>
+                </a:solidFill>
+                <a:latin typeface="Times New Roman" panose="02020603050405020304" pitchFamily="18" charset="0"/>
+                <a:cs typeface="Times New Roman" panose="02020603050405020304" pitchFamily="18" charset="0"/>
+              </a:rPr>
+              <a:t>-сервис – </a:t>
+            </a:r>
+            <a:r>
+              <a:rPr lang="ru-RU" sz="2000" dirty="0" smtClean="0">
+                <a:solidFill>
+                  <a:schemeClr val="tx1"/>
+                </a:solidFill>
+                <a:latin typeface="Times New Roman" panose="02020603050405020304" pitchFamily="18" charset="0"/>
+                <a:cs typeface="Times New Roman" panose="02020603050405020304" pitchFamily="18" charset="0"/>
+              </a:rPr>
+              <a:t>это программа</a:t>
+            </a:r>
+            <a:r>
+              <a:rPr lang="ru-RU" sz="2000" dirty="0">
+                <a:solidFill>
+                  <a:schemeClr val="tx1"/>
+                </a:solidFill>
+                <a:latin typeface="Times New Roman" panose="02020603050405020304" pitchFamily="18" charset="0"/>
+                <a:cs typeface="Times New Roman" panose="02020603050405020304" pitchFamily="18" charset="0"/>
+              </a:rPr>
+              <a:t>, которая </a:t>
+            </a:r>
+            <a:r>
+              <a:rPr lang="ru-RU" sz="2000" dirty="0" smtClean="0">
+                <a:solidFill>
+                  <a:schemeClr val="tx1"/>
+                </a:solidFill>
+                <a:latin typeface="Times New Roman" panose="02020603050405020304" pitchFamily="18" charset="0"/>
+                <a:cs typeface="Times New Roman" panose="02020603050405020304" pitchFamily="18" charset="0"/>
+              </a:rPr>
+              <a:t>отвечает на запросы клиентов</a:t>
+            </a:r>
+          </a:p>
+        </p:txBody>
+      </p:sp>
+      <p:pic>
+        <p:nvPicPr>
+          <p:cNvPr id="7" name="Рисунок 6"/>
+          <p:cNvPicPr>
+            <a:picLocks noChangeAspect="1"/>
+          </p:cNvPicPr>
+          <p:nvPr/>
+        </p:nvPicPr>
+        <p:blipFill>
+          <a:blip r:embed="rId3">
+            <a:extLst>
+              <a:ext uri="{28A0092B-C50C-407E-A947-70E740481C1C}">
+                <a14:useLocalDpi xmlns:a14="http://schemas.microsoft.com/office/drawing/2010/main" val="0"/>
+              </a:ext>
+            </a:extLst>
+          </a:blip>
+          <a:stretch>
+            <a:fillRect/>
+          </a:stretch>
+        </p:blipFill>
+        <p:spPr>
+          <a:xfrm>
+            <a:off x="253096" y="1906623"/>
+            <a:ext cx="6110045" cy="4189377"/>
+          </a:xfrm>
+          <a:prstGeom prst="rect">
+            <a:avLst/>
+          </a:prstGeom>
+        </p:spPr>
+      </p:pic>
+      <p:sp>
+        <p:nvSpPr>
+          <p:cNvPr id="8" name="TextBox 7"/>
+          <p:cNvSpPr txBox="1"/>
+          <p:nvPr/>
+        </p:nvSpPr>
+        <p:spPr>
+          <a:xfrm>
+            <a:off x="6078583" y="1915882"/>
+            <a:ext cx="3065417" cy="3970318"/>
+          </a:xfrm>
+          <a:prstGeom prst="rect">
+            <a:avLst/>
+          </a:prstGeom>
+          <a:noFill/>
+        </p:spPr>
+        <p:txBody>
+          <a:bodyPr wrap="square" rtlCol="0">
+            <a:spAutoFit/>
+          </a:bodyPr>
+          <a:lstStyle/>
+          <a:p>
+            <a:pPr marL="285750" indent="-285750" algn="just">
+              <a:buFont typeface="Arial" panose="020B0604020202020204" pitchFamily="34" charset="0"/>
+              <a:buChar char="•"/>
+            </a:pPr>
+            <a:r>
+              <a:rPr lang="ru-RU" dirty="0" smtClean="0">
+                <a:latin typeface="Times New Roman" panose="02020603050405020304" pitchFamily="18" charset="0"/>
+                <a:cs typeface="Times New Roman" panose="02020603050405020304" pitchFamily="18" charset="0"/>
+              </a:rPr>
+              <a:t>Клиент с помощью </a:t>
+            </a:r>
+            <a:r>
+              <a:rPr lang="en-US" dirty="0" smtClean="0">
+                <a:latin typeface="Times New Roman" panose="02020603050405020304" pitchFamily="18" charset="0"/>
+                <a:cs typeface="Times New Roman" panose="02020603050405020304" pitchFamily="18" charset="0"/>
+              </a:rPr>
+              <a:t>http</a:t>
+            </a:r>
+            <a:r>
+              <a:rPr lang="ru-RU" dirty="0">
+                <a:latin typeface="Times New Roman" panose="02020603050405020304" pitchFamily="18" charset="0"/>
+                <a:cs typeface="Times New Roman" panose="02020603050405020304" pitchFamily="18" charset="0"/>
+              </a:rPr>
+              <a:t>-</a:t>
+            </a:r>
+            <a:r>
+              <a:rPr lang="ru-RU" dirty="0" smtClean="0">
+                <a:latin typeface="Times New Roman" panose="02020603050405020304" pitchFamily="18" charset="0"/>
+                <a:cs typeface="Times New Roman" panose="02020603050405020304" pitchFamily="18" charset="0"/>
+              </a:rPr>
+              <a:t>протокола будет посылать запросы на конкретные функции сервиса, например на: 244.12.56.72</a:t>
+            </a:r>
+            <a:r>
+              <a:rPr lang="en-US" dirty="0" smtClean="0">
+                <a:latin typeface="Times New Roman" panose="02020603050405020304" pitchFamily="18" charset="0"/>
+                <a:cs typeface="Times New Roman" panose="02020603050405020304" pitchFamily="18" charset="0"/>
+              </a:rPr>
+              <a:t>/streets   </a:t>
+            </a:r>
+            <a:r>
+              <a:rPr lang="ru-RU" dirty="0" smtClean="0">
+                <a:latin typeface="Times New Roman" panose="02020603050405020304" pitchFamily="18" charset="0"/>
+                <a:cs typeface="Times New Roman" panose="02020603050405020304" pitchFamily="18" charset="0"/>
+              </a:rPr>
+              <a:t>244.12.56.72</a:t>
+            </a:r>
+            <a:r>
+              <a:rPr lang="en-US" dirty="0" smtClean="0">
+                <a:latin typeface="Times New Roman" panose="02020603050405020304" pitchFamily="18" charset="0"/>
+                <a:cs typeface="Times New Roman" panose="02020603050405020304" pitchFamily="18" charset="0"/>
+              </a:rPr>
+              <a:t>/</a:t>
+            </a:r>
+            <a:r>
+              <a:rPr lang="en-US" dirty="0" err="1" smtClean="0">
+                <a:latin typeface="Times New Roman" panose="02020603050405020304" pitchFamily="18" charset="0"/>
+                <a:cs typeface="Times New Roman" panose="02020603050405020304" pitchFamily="18" charset="0"/>
+              </a:rPr>
+              <a:t>telnums</a:t>
+            </a:r>
+            <a:endParaRPr lang="ru-RU" dirty="0" smtClean="0">
+              <a:latin typeface="Times New Roman" panose="02020603050405020304" pitchFamily="18" charset="0"/>
+              <a:cs typeface="Times New Roman" panose="02020603050405020304" pitchFamily="18" charset="0"/>
+            </a:endParaRPr>
+          </a:p>
+          <a:p>
+            <a:pPr marL="285750" indent="-285750" algn="just">
+              <a:buFont typeface="Arial" panose="020B0604020202020204" pitchFamily="34" charset="0"/>
+              <a:buChar char="•"/>
+            </a:pPr>
+            <a:endParaRPr lang="ru-RU" dirty="0" smtClean="0">
+              <a:latin typeface="Times New Roman" panose="02020603050405020304" pitchFamily="18" charset="0"/>
+              <a:cs typeface="Times New Roman" panose="02020603050405020304" pitchFamily="18" charset="0"/>
+            </a:endParaRPr>
+          </a:p>
+          <a:p>
+            <a:pPr marL="285750" indent="-285750" algn="just">
+              <a:buFont typeface="Arial" panose="020B0604020202020204" pitchFamily="34" charset="0"/>
+              <a:buChar char="•"/>
+            </a:pPr>
+            <a:r>
+              <a:rPr lang="ru-RU" dirty="0" smtClean="0">
+                <a:latin typeface="Times New Roman" panose="02020603050405020304" pitchFamily="18" charset="0"/>
+                <a:cs typeface="Times New Roman" panose="02020603050405020304" pitchFamily="18" charset="0"/>
+              </a:rPr>
+              <a:t>Сервис, при необходимости обращаясь </a:t>
+            </a:r>
+            <a:r>
+              <a:rPr lang="ru-RU" dirty="0">
+                <a:latin typeface="Times New Roman" panose="02020603050405020304" pitchFamily="18" charset="0"/>
+                <a:cs typeface="Times New Roman" panose="02020603050405020304" pitchFamily="18" charset="0"/>
+              </a:rPr>
+              <a:t>к файлу с  </a:t>
+            </a:r>
+            <a:r>
+              <a:rPr lang="ru-RU" dirty="0" smtClean="0">
+                <a:latin typeface="Times New Roman" panose="02020603050405020304" pitchFamily="18" charset="0"/>
+                <a:cs typeface="Times New Roman" panose="02020603050405020304" pitchFamily="18" charset="0"/>
+              </a:rPr>
+              <a:t>данными, будет возвращать необходимую информацию в формате </a:t>
+            </a:r>
+            <a:r>
+              <a:rPr lang="en-US" dirty="0" smtClean="0">
+                <a:latin typeface="Times New Roman" panose="02020603050405020304" pitchFamily="18" charset="0"/>
+                <a:cs typeface="Times New Roman" panose="02020603050405020304" pitchFamily="18" charset="0"/>
+              </a:rPr>
+              <a:t>JSON</a:t>
+            </a:r>
+            <a:endParaRPr lang="ru-RU" dirty="0">
+              <a:latin typeface="Times New Roman" panose="02020603050405020304" pitchFamily="18" charset="0"/>
+              <a:cs typeface="Times New Roman" panose="02020603050405020304" pitchFamily="18" charset="0"/>
+            </a:endParaRPr>
+          </a:p>
+        </p:txBody>
+      </p:sp>
+    </p:spTree>
+    <p:extLst>
+      <p:ext uri="{BB962C8B-B14F-4D97-AF65-F5344CB8AC3E}">
+        <p14:creationId xmlns:p14="http://schemas.microsoft.com/office/powerpoint/2010/main" val="3769501295"/>
+      </p:ext>
+    </p:extLst>
+  </p:cSld>
+  <p:clrMapOvr>
+    <a:masterClrMapping/>
+  </p:clrMapOvr>
+  <p:timing>
+    <p:tnLst>
+      <p:par>
+        <p:cTn id="1" dur="indefinite" restart="never" nodeType="tmRoot"/>
+      </p:par>
+    </p:tnLst>
+  </p:timing>
+</p:sld>
+</file>
+
+<file path=ppt/slides/slide17.xml><?xml version="1.0" encoding="utf-8"?>
 <p:sld xmlns:a="http://schemas.openxmlformats.org/drawingml/2006/main" xmlns:r="http://schemas.openxmlformats.org/officeDocument/2006/relationships" xmlns:p="http://schemas.openxmlformats.org/presentationml/2006/main">
   <p:cSld>
     <p:spTree>
@@ -6234,7 +8650,7 @@
 </p:sld>
 </file>
 
-<file path=ppt/slides/slide15.xml><?xml version="1.0" encoding="utf-8"?>
+<file path=ppt/slides/slide18.xml><?xml version="1.0" encoding="utf-8"?>
 <p:sld xmlns:a="http://schemas.openxmlformats.org/drawingml/2006/main" xmlns:r="http://schemas.openxmlformats.org/officeDocument/2006/relationships" xmlns:p="http://schemas.openxmlformats.org/presentationml/2006/main">
   <p:cSld>
     <p:spTree>
@@ -6268,7 +8684,11 @@
           <a:p>
             <a:r>
               <a:rPr lang="ru-RU" dirty="0" smtClean="0"/>
-              <a:t>Задание 2</a:t>
+              <a:t>Задание </a:t>
+            </a:r>
+            <a:r>
+              <a:rPr lang="en-US" dirty="0" smtClean="0"/>
+              <a:t>1</a:t>
             </a:r>
             <a:endParaRPr lang="ru-RU" dirty="0"/>
           </a:p>
@@ -6797,7 +9217,7 @@
 </p:sld>
 </file>
 
-<file path=ppt/slides/slide16.xml><?xml version="1.0" encoding="utf-8"?>
+<file path=ppt/slides/slide19.xml><?xml version="1.0" encoding="utf-8"?>
 <p:sld xmlns:a="http://schemas.openxmlformats.org/drawingml/2006/main" xmlns:r="http://schemas.openxmlformats.org/officeDocument/2006/relationships" xmlns:p="http://schemas.openxmlformats.org/presentationml/2006/main">
   <p:cSld>
     <p:spTree>
@@ -6831,7 +9251,11 @@
           <a:p>
             <a:r>
               <a:rPr lang="ru-RU" dirty="0" smtClean="0"/>
-              <a:t>Задание 3</a:t>
+              <a:t>Задание </a:t>
+            </a:r>
+            <a:r>
+              <a:rPr lang="en-US" dirty="0" smtClean="0"/>
+              <a:t>2</a:t>
             </a:r>
             <a:endParaRPr lang="ru-RU" dirty="0"/>
           </a:p>
@@ -7145,184 +9569,6 @@
       </p:par>
     </p:tnLst>
   </p:timing>
-</p:sld>
-</file>
-
-<file path=ppt/slides/slide17.xml><?xml version="1.0" encoding="utf-8"?>
-<p:sld xmlns:a="http://schemas.openxmlformats.org/drawingml/2006/main" xmlns:r="http://schemas.openxmlformats.org/officeDocument/2006/relationships" xmlns:p="http://schemas.openxmlformats.org/presentationml/2006/main">
-  <p:cSld>
-    <p:spTree>
-      <p:nvGrpSpPr>
-        <p:cNvPr id="1" name=""/>
-        <p:cNvGrpSpPr/>
-        <p:nvPr/>
-      </p:nvGrpSpPr>
-      <p:grpSpPr>
-        <a:xfrm>
-          <a:off x="0" y="0"/>
-          <a:ext cx="0" cy="0"/>
-          <a:chOff x="0" y="0"/>
-          <a:chExt cx="0" cy="0"/>
-        </a:xfrm>
-      </p:grpSpPr>
-      <p:sp>
-        <p:nvSpPr>
-          <p:cNvPr id="3" name="Заголовок 2"/>
-          <p:cNvSpPr>
-            <a:spLocks noGrp="1"/>
-          </p:cNvSpPr>
-          <p:nvPr>
-            <p:ph type="title"/>
-          </p:nvPr>
-        </p:nvSpPr>
-        <p:spPr/>
-        <p:txBody>
-          <a:bodyPr/>
-          <a:lstStyle/>
-          <a:p>
-            <a:r>
-              <a:rPr lang="ru-RU" dirty="0"/>
-              <a:t>К</a:t>
-            </a:r>
-            <a:r>
-              <a:rPr lang="ru-RU" dirty="0" smtClean="0"/>
-              <a:t>лиенты</a:t>
-            </a:r>
-            <a:endParaRPr lang="ru-RU" dirty="0"/>
-          </a:p>
-        </p:txBody>
-      </p:sp>
-      <p:sp>
-        <p:nvSpPr>
-          <p:cNvPr id="4" name="Текст 3">
-            <a:extLst>
-              <a:ext uri="{FF2B5EF4-FFF2-40B4-BE49-F238E27FC236}">
-                <a16:creationId xmlns:a16="http://schemas.microsoft.com/office/drawing/2014/main" id="{74C82C9C-F2A8-41A8-880B-73811E3EFC36}"/>
-              </a:ext>
-            </a:extLst>
-          </p:cNvPr>
-          <p:cNvSpPr>
-            <a:spLocks noGrp="1"/>
-          </p:cNvSpPr>
-          <p:nvPr>
-            <p:ph type="body" sz="quarter" idx="11"/>
-          </p:nvPr>
-        </p:nvSpPr>
-        <p:spPr>
-          <a:xfrm>
-            <a:off x="253096" y="6534445"/>
-            <a:ext cx="8602515" cy="323557"/>
-          </a:xfrm>
-        </p:spPr>
-        <p:txBody>
-          <a:bodyPr/>
-          <a:lstStyle/>
-          <a:p>
-            <a:endParaRPr lang="ru-RU" dirty="0"/>
-          </a:p>
-        </p:txBody>
-      </p:sp>
-    </p:spTree>
-    <p:extLst>
-      <p:ext uri="{BB962C8B-B14F-4D97-AF65-F5344CB8AC3E}">
-        <p14:creationId xmlns:p14="http://schemas.microsoft.com/office/powerpoint/2010/main" val="4131561368"/>
-      </p:ext>
-    </p:extLst>
-  </p:cSld>
-  <p:clrMapOvr>
-    <a:masterClrMapping/>
-  </p:clrMapOvr>
-</p:sld>
-</file>
-
-<file path=ppt/slides/slide18.xml><?xml version="1.0" encoding="utf-8"?>
-<p:sld xmlns:a="http://schemas.openxmlformats.org/drawingml/2006/main" xmlns:r="http://schemas.openxmlformats.org/officeDocument/2006/relationships" xmlns:p="http://schemas.openxmlformats.org/presentationml/2006/main">
-  <p:cSld>
-    <p:spTree>
-      <p:nvGrpSpPr>
-        <p:cNvPr id="1" name=""/>
-        <p:cNvGrpSpPr/>
-        <p:nvPr/>
-      </p:nvGrpSpPr>
-      <p:grpSpPr>
-        <a:xfrm>
-          <a:off x="0" y="0"/>
-          <a:ext cx="0" cy="0"/>
-          <a:chOff x="0" y="0"/>
-          <a:chExt cx="0" cy="0"/>
-        </a:xfrm>
-      </p:grpSpPr>
-      <p:sp>
-        <p:nvSpPr>
-          <p:cNvPr id="3" name="Заголовок 2"/>
-          <p:cNvSpPr>
-            <a:spLocks noGrp="1"/>
-          </p:cNvSpPr>
-          <p:nvPr>
-            <p:ph type="title"/>
-          </p:nvPr>
-        </p:nvSpPr>
-        <p:spPr/>
-        <p:txBody>
-          <a:bodyPr/>
-          <a:lstStyle/>
-          <a:p>
-            <a:r>
-              <a:rPr lang="en-US" dirty="0" smtClean="0"/>
-              <a:t>Frontend</a:t>
-            </a:r>
-            <a:r>
-              <a:rPr lang="ru-RU" dirty="0" smtClean="0"/>
-              <a:t> и </a:t>
-            </a:r>
-            <a:r>
-              <a:rPr lang="en-US" dirty="0" smtClean="0"/>
-              <a:t>Backend</a:t>
-            </a:r>
-            <a:endParaRPr lang="ru-RU" dirty="0"/>
-          </a:p>
-        </p:txBody>
-      </p:sp>
-      <p:sp>
-        <p:nvSpPr>
-          <p:cNvPr id="4" name="Текст 3">
-            <a:extLst>
-              <a:ext uri="{FF2B5EF4-FFF2-40B4-BE49-F238E27FC236}">
-                <a16:creationId xmlns:a16="http://schemas.microsoft.com/office/drawing/2014/main" id="{74C82C9C-F2A8-41A8-880B-73811E3EFC36}"/>
-              </a:ext>
-            </a:extLst>
-          </p:cNvPr>
-          <p:cNvSpPr>
-            <a:spLocks noGrp="1"/>
-          </p:cNvSpPr>
-          <p:nvPr>
-            <p:ph type="body" sz="quarter" idx="11"/>
-          </p:nvPr>
-        </p:nvSpPr>
-        <p:spPr>
-          <a:xfrm>
-            <a:off x="253096" y="6534445"/>
-            <a:ext cx="8602515" cy="323557"/>
-          </a:xfrm>
-        </p:spPr>
-        <p:txBody>
-          <a:bodyPr/>
-          <a:lstStyle/>
-          <a:p>
-            <a:endParaRPr lang="ru-RU" dirty="0"/>
-          </a:p>
-        </p:txBody>
-      </p:sp>
-    </p:spTree>
-    <p:extLst>
-      <p:ext uri="{BB962C8B-B14F-4D97-AF65-F5344CB8AC3E}">
-        <p14:creationId xmlns:p14="http://schemas.microsoft.com/office/powerpoint/2010/main" val="2283449239"/>
-      </p:ext>
-    </p:extLst>
-  </p:cSld>
-  <p:clrMapOvr>
-    <a:masterClrMapping/>
-  </p:clrMapOvr>
 </p:sld>
 </file>
 
@@ -7772,6 +10018,291 @@
   <p:clrMapOvr>
     <a:masterClrMapping/>
   </p:clrMapOvr>
+  <p:timing>
+    <p:tnLst>
+      <p:par>
+        <p:cTn id="1" dur="indefinite" restart="never" nodeType="tmRoot"/>
+      </p:par>
+    </p:tnLst>
+  </p:timing>
+</p:sld>
+</file>
+
+<file path=ppt/slides/slide20.xml><?xml version="1.0" encoding="utf-8"?>
+<p:sld xmlns:a="http://schemas.openxmlformats.org/drawingml/2006/main" xmlns:r="http://schemas.openxmlformats.org/officeDocument/2006/relationships" xmlns:p="http://schemas.openxmlformats.org/presentationml/2006/main">
+  <p:cSld>
+    <p:spTree>
+      <p:nvGrpSpPr>
+        <p:cNvPr id="1" name=""/>
+        <p:cNvGrpSpPr/>
+        <p:nvPr/>
+      </p:nvGrpSpPr>
+      <p:grpSpPr>
+        <a:xfrm>
+          <a:off x="0" y="0"/>
+          <a:ext cx="0" cy="0"/>
+          <a:chOff x="0" y="0"/>
+          <a:chExt cx="0" cy="0"/>
+        </a:xfrm>
+      </p:grpSpPr>
+      <p:sp>
+        <p:nvSpPr>
+          <p:cNvPr id="3" name="Заголовок 2"/>
+          <p:cNvSpPr>
+            <a:spLocks noGrp="1"/>
+          </p:cNvSpPr>
+          <p:nvPr>
+            <p:ph type="title"/>
+          </p:nvPr>
+        </p:nvSpPr>
+        <p:spPr/>
+        <p:txBody>
+          <a:bodyPr/>
+          <a:lstStyle/>
+          <a:p>
+            <a:r>
+              <a:rPr lang="en-US" dirty="0" smtClean="0"/>
+              <a:t>Frontend</a:t>
+            </a:r>
+            <a:r>
+              <a:rPr lang="ru-RU" dirty="0" smtClean="0"/>
+              <a:t> и </a:t>
+            </a:r>
+            <a:r>
+              <a:rPr lang="en-US" dirty="0" smtClean="0"/>
+              <a:t>Backend</a:t>
+            </a:r>
+            <a:endParaRPr lang="ru-RU" dirty="0"/>
+          </a:p>
+        </p:txBody>
+      </p:sp>
+      <p:sp>
+        <p:nvSpPr>
+          <p:cNvPr id="4" name="Текст 3">
+            <a:extLst>
+              <a:ext uri="{FF2B5EF4-FFF2-40B4-BE49-F238E27FC236}">
+                <a16:creationId xmlns:a16="http://schemas.microsoft.com/office/drawing/2014/main" id="{74C82C9C-F2A8-41A8-880B-73811E3EFC36}"/>
+              </a:ext>
+            </a:extLst>
+          </p:cNvPr>
+          <p:cNvSpPr>
+            <a:spLocks noGrp="1"/>
+          </p:cNvSpPr>
+          <p:nvPr>
+            <p:ph type="body" sz="quarter" idx="11"/>
+          </p:nvPr>
+        </p:nvSpPr>
+        <p:spPr>
+          <a:xfrm>
+            <a:off x="253096" y="6534445"/>
+            <a:ext cx="8602515" cy="323557"/>
+          </a:xfrm>
+        </p:spPr>
+        <p:txBody>
+          <a:bodyPr/>
+          <a:lstStyle/>
+          <a:p>
+            <a:endParaRPr lang="ru-RU" dirty="0"/>
+          </a:p>
+        </p:txBody>
+      </p:sp>
+    </p:spTree>
+    <p:extLst>
+      <p:ext uri="{BB962C8B-B14F-4D97-AF65-F5344CB8AC3E}">
+        <p14:creationId xmlns:p14="http://schemas.microsoft.com/office/powerpoint/2010/main" val="2283449239"/>
+      </p:ext>
+    </p:extLst>
+  </p:cSld>
+  <p:clrMapOvr>
+    <a:masterClrMapping/>
+  </p:clrMapOvr>
+  <p:timing>
+    <p:tnLst>
+      <p:par>
+        <p:cTn id="1" dur="indefinite" restart="never" nodeType="tmRoot"/>
+      </p:par>
+    </p:tnLst>
+  </p:timing>
+</p:sld>
+</file>
+
+<file path=ppt/slides/slide21.xml><?xml version="1.0" encoding="utf-8"?>
+<p:sld xmlns:a="http://schemas.openxmlformats.org/drawingml/2006/main" xmlns:r="http://schemas.openxmlformats.org/officeDocument/2006/relationships" xmlns:p="http://schemas.openxmlformats.org/presentationml/2006/main">
+  <p:cSld>
+    <p:spTree>
+      <p:nvGrpSpPr>
+        <p:cNvPr id="1" name=""/>
+        <p:cNvGrpSpPr/>
+        <p:nvPr/>
+      </p:nvGrpSpPr>
+      <p:grpSpPr>
+        <a:xfrm>
+          <a:off x="0" y="0"/>
+          <a:ext cx="0" cy="0"/>
+          <a:chOff x="0" y="0"/>
+          <a:chExt cx="0" cy="0"/>
+        </a:xfrm>
+      </p:grpSpPr>
+      <p:sp>
+        <p:nvSpPr>
+          <p:cNvPr id="3" name="Заголовок 2"/>
+          <p:cNvSpPr>
+            <a:spLocks noGrp="1"/>
+          </p:cNvSpPr>
+          <p:nvPr>
+            <p:ph type="title"/>
+          </p:nvPr>
+        </p:nvSpPr>
+        <p:spPr/>
+        <p:txBody>
+          <a:bodyPr/>
+          <a:lstStyle/>
+          <a:p>
+            <a:r>
+              <a:rPr lang="ru-RU" dirty="0" smtClean="0"/>
+              <a:t>Что может выступать в качестве клиента?</a:t>
+            </a:r>
+            <a:endParaRPr lang="ru-RU" dirty="0"/>
+          </a:p>
+        </p:txBody>
+      </p:sp>
+      <p:sp>
+        <p:nvSpPr>
+          <p:cNvPr id="4" name="Текст 3">
+            <a:extLst>
+              <a:ext uri="{FF2B5EF4-FFF2-40B4-BE49-F238E27FC236}">
+                <a16:creationId xmlns:a16="http://schemas.microsoft.com/office/drawing/2014/main" id="{74C82C9C-F2A8-41A8-880B-73811E3EFC36}"/>
+              </a:ext>
+            </a:extLst>
+          </p:cNvPr>
+          <p:cNvSpPr>
+            <a:spLocks noGrp="1"/>
+          </p:cNvSpPr>
+          <p:nvPr>
+            <p:ph type="body" sz="quarter" idx="11"/>
+          </p:nvPr>
+        </p:nvSpPr>
+        <p:spPr>
+          <a:xfrm>
+            <a:off x="253096" y="6534445"/>
+            <a:ext cx="8602515" cy="323557"/>
+          </a:xfrm>
+        </p:spPr>
+        <p:txBody>
+          <a:bodyPr/>
+          <a:lstStyle/>
+          <a:p>
+            <a:endParaRPr lang="ru-RU" dirty="0"/>
+          </a:p>
+        </p:txBody>
+      </p:sp>
+    </p:spTree>
+    <p:extLst>
+      <p:ext uri="{BB962C8B-B14F-4D97-AF65-F5344CB8AC3E}">
+        <p14:creationId xmlns:p14="http://schemas.microsoft.com/office/powerpoint/2010/main" val="659875373"/>
+      </p:ext>
+    </p:extLst>
+  </p:cSld>
+  <p:clrMapOvr>
+    <a:masterClrMapping/>
+  </p:clrMapOvr>
+  <p:timing>
+    <p:tnLst>
+      <p:par>
+        <p:cTn id="1" dur="indefinite" restart="never" nodeType="tmRoot"/>
+      </p:par>
+    </p:tnLst>
+  </p:timing>
+</p:sld>
+</file>
+
+<file path=ppt/slides/slide22.xml><?xml version="1.0" encoding="utf-8"?>
+<p:sld xmlns:a="http://schemas.openxmlformats.org/drawingml/2006/main" xmlns:r="http://schemas.openxmlformats.org/officeDocument/2006/relationships" xmlns:p="http://schemas.openxmlformats.org/presentationml/2006/main">
+  <p:cSld>
+    <p:spTree>
+      <p:nvGrpSpPr>
+        <p:cNvPr id="1" name=""/>
+        <p:cNvGrpSpPr/>
+        <p:nvPr/>
+      </p:nvGrpSpPr>
+      <p:grpSpPr>
+        <a:xfrm>
+          <a:off x="0" y="0"/>
+          <a:ext cx="0" cy="0"/>
+          <a:chOff x="0" y="0"/>
+          <a:chExt cx="0" cy="0"/>
+        </a:xfrm>
+      </p:grpSpPr>
+      <p:sp>
+        <p:nvSpPr>
+          <p:cNvPr id="3" name="Заголовок 2"/>
+          <p:cNvSpPr>
+            <a:spLocks noGrp="1"/>
+          </p:cNvSpPr>
+          <p:nvPr>
+            <p:ph type="title"/>
+          </p:nvPr>
+        </p:nvSpPr>
+        <p:spPr/>
+        <p:txBody>
+          <a:bodyPr/>
+          <a:lstStyle/>
+          <a:p>
+            <a:r>
+              <a:rPr lang="en-US" dirty="0" smtClean="0"/>
+              <a:t>Curl</a:t>
+            </a:r>
+            <a:endParaRPr lang="ru-RU" dirty="0"/>
+          </a:p>
+        </p:txBody>
+      </p:sp>
+      <p:sp>
+        <p:nvSpPr>
+          <p:cNvPr id="4" name="Текст 3">
+            <a:extLst>
+              <a:ext uri="{FF2B5EF4-FFF2-40B4-BE49-F238E27FC236}">
+                <a16:creationId xmlns:a16="http://schemas.microsoft.com/office/drawing/2014/main" id="{74C82C9C-F2A8-41A8-880B-73811E3EFC36}"/>
+              </a:ext>
+            </a:extLst>
+          </p:cNvPr>
+          <p:cNvSpPr>
+            <a:spLocks noGrp="1"/>
+          </p:cNvSpPr>
+          <p:nvPr>
+            <p:ph type="body" sz="quarter" idx="11"/>
+          </p:nvPr>
+        </p:nvSpPr>
+        <p:spPr>
+          <a:xfrm>
+            <a:off x="253096" y="6534445"/>
+            <a:ext cx="8602515" cy="323557"/>
+          </a:xfrm>
+        </p:spPr>
+        <p:txBody>
+          <a:bodyPr/>
+          <a:lstStyle/>
+          <a:p>
+            <a:endParaRPr lang="ru-RU" dirty="0"/>
+          </a:p>
+        </p:txBody>
+      </p:sp>
+    </p:spTree>
+    <p:extLst>
+      <p:ext uri="{BB962C8B-B14F-4D97-AF65-F5344CB8AC3E}">
+        <p14:creationId xmlns:p14="http://schemas.microsoft.com/office/powerpoint/2010/main" val="4131561368"/>
+      </p:ext>
+    </p:extLst>
+  </p:cSld>
+  <p:clrMapOvr>
+    <a:masterClrMapping/>
+  </p:clrMapOvr>
+  <p:timing>
+    <p:tnLst>
+      <p:par>
+        <p:cTn id="1" dur="indefinite" restart="never" nodeType="tmRoot"/>
+      </p:par>
+    </p:tnLst>
+  </p:timing>
 </p:sld>
 </file>
 
@@ -8188,6 +10719,13 @@
   <p:clrMapOvr>
     <a:masterClrMapping/>
   </p:clrMapOvr>
+  <p:timing>
+    <p:tnLst>
+      <p:par>
+        <p:cTn id="1" dur="indefinite" restart="never" nodeType="tmRoot"/>
+      </p:par>
+    </p:tnLst>
+  </p:timing>
 </p:sld>
 </file>
 
@@ -8584,6 +11122,13 @@
   <p:clrMapOvr>
     <a:masterClrMapping/>
   </p:clrMapOvr>
+  <p:timing>
+    <p:tnLst>
+      <p:par>
+        <p:cTn id="1" dur="indefinite" restart="never" nodeType="tmRoot"/>
+      </p:par>
+    </p:tnLst>
+  </p:timing>
 </p:sld>
 </file>
 
@@ -8878,7 +11423,7 @@
           <a:p>
             <a:pPr indent="0" algn="just"/>
             <a:r>
-              <a:rPr lang="en-US" sz="2000" dirty="0" smtClean="0">
+              <a:rPr lang="en-US" sz="2000" b="1" dirty="0" smtClean="0">
                 <a:solidFill>
                   <a:schemeClr val="tx1"/>
                 </a:solidFill>
@@ -8888,6 +11433,16 @@
               <a:t>Web</a:t>
             </a:r>
             <a:r>
+              <a:rPr lang="ru-RU" sz="2000" b="1" dirty="0" smtClean="0">
+                <a:solidFill>
+                  <a:schemeClr val="tx1"/>
+                </a:solidFill>
+                <a:latin typeface="Times New Roman" panose="02020603050405020304" pitchFamily="18" charset="0"/>
+                <a:cs typeface="Times New Roman" panose="02020603050405020304" pitchFamily="18" charset="0"/>
+              </a:rPr>
+              <a:t>-сервис способен удовлетворить все эти требования</a:t>
+            </a:r>
+            <a:r>
               <a:rPr lang="ru-RU" sz="2000" dirty="0" smtClean="0">
                 <a:solidFill>
                   <a:schemeClr val="tx1"/>
@@ -8895,7 +11450,7 @@
                 <a:latin typeface="Times New Roman" panose="02020603050405020304" pitchFamily="18" charset="0"/>
                 <a:cs typeface="Times New Roman" panose="02020603050405020304" pitchFamily="18" charset="0"/>
               </a:rPr>
-              <a:t>-сервис способен удовлетворить все эти требования.</a:t>
+              <a:t>.</a:t>
             </a:r>
           </a:p>
           <a:p>
@@ -9130,6 +11685,13 @@
   <p:clrMapOvr>
     <a:masterClrMapping/>
   </p:clrMapOvr>
+  <p:timing>
+    <p:tnLst>
+      <p:par>
+        <p:cTn id="1" dur="indefinite" restart="never" nodeType="tmRoot"/>
+      </p:par>
+    </p:tnLst>
+  </p:timing>
 </p:sld>
 </file>
 
@@ -9632,6 +12194,13 @@
   <p:clrMapOvr>
     <a:masterClrMapping/>
   </p:clrMapOvr>
+  <p:timing>
+    <p:tnLst>
+      <p:par>
+        <p:cTn id="1" dur="indefinite" restart="never" nodeType="tmRoot"/>
+      </p:par>
+    </p:tnLst>
+  </p:timing>
 </p:sld>
 </file>
 
@@ -9991,6 +12560,16 @@
           </a:p>
           <a:p>
             <a:pPr algn="just"/>
+            <a:endParaRPr lang="ru-RU" sz="2000" dirty="0" smtClean="0">
+              <a:solidFill>
+                <a:schemeClr val="tx1"/>
+              </a:solidFill>
+              <a:latin typeface="Times New Roman" panose="02020603050405020304" pitchFamily="18" charset="0"/>
+              <a:cs typeface="Times New Roman" panose="02020603050405020304" pitchFamily="18" charset="0"/>
+            </a:endParaRPr>
+          </a:p>
+          <a:p>
+            <a:pPr algn="just"/>
             <a:r>
               <a:rPr lang="ru-RU" sz="2000" dirty="0" smtClean="0">
                 <a:solidFill>
@@ -10136,6 +12715,13 @@
   <p:clrMapOvr>
     <a:masterClrMapping/>
   </p:clrMapOvr>
+  <p:timing>
+    <p:tnLst>
+      <p:par>
+        <p:cTn id="1" dur="indefinite" restart="never" nodeType="tmRoot"/>
+      </p:par>
+    </p:tnLst>
+  </p:timing>
 </p:sld>
 </file>
 
@@ -10610,6 +13196,13 @@
   <p:clrMapOvr>
     <a:masterClrMapping/>
   </p:clrMapOvr>
+  <p:timing>
+    <p:tnLst>
+      <p:par>
+        <p:cTn id="1" dur="indefinite" restart="never" nodeType="tmRoot"/>
+      </p:par>
+    </p:tnLst>
+  </p:timing>
 </p:sld>
 </file>
 
@@ -11057,6 +13650,13 @@
   <p:clrMapOvr>
     <a:masterClrMapping/>
   </p:clrMapOvr>
+  <p:timing>
+    <p:tnLst>
+      <p:par>
+        <p:cTn id="1" dur="indefinite" restart="never" nodeType="tmRoot"/>
+      </p:par>
+    </p:tnLst>
+  </p:timing>
 </p:sld>
 </file>
 

</xml_diff>